<commit_message>
Finished 4:3 ratio conversion
</commit_message>
<xml_diff>
--- a/MobileAuthWebWorld.pptx
+++ b/MobileAuthWebWorld.pptx
@@ -6,7 +6,7 @@
     <p:sldMasterId id="2147483661" r:id="rId2"/>
   </p:sldMasterIdLst>
   <p:notesMasterIdLst>
-    <p:notesMasterId r:id="rId40"/>
+    <p:notesMasterId r:id="rId42"/>
   </p:notesMasterIdLst>
   <p:sldIdLst>
     <p:sldId id="256" r:id="rId3"/>
@@ -41,11 +41,13 @@
     <p:sldId id="277" r:id="rId32"/>
     <p:sldId id="290" r:id="rId33"/>
     <p:sldId id="274" r:id="rId34"/>
-    <p:sldId id="280" r:id="rId35"/>
-    <p:sldId id="281" r:id="rId36"/>
-    <p:sldId id="282" r:id="rId37"/>
-    <p:sldId id="283" r:id="rId38"/>
-    <p:sldId id="284" r:id="rId39"/>
+    <p:sldId id="295" r:id="rId35"/>
+    <p:sldId id="296" r:id="rId36"/>
+    <p:sldId id="280" r:id="rId37"/>
+    <p:sldId id="281" r:id="rId38"/>
+    <p:sldId id="282" r:id="rId39"/>
+    <p:sldId id="283" r:id="rId40"/>
+    <p:sldId id="284" r:id="rId41"/>
   </p:sldIdLst>
   <p:sldSz cx="9144000" cy="6858000" type="screen4x3"/>
   <p:notesSz cx="6858000" cy="9144000"/>
@@ -262,7 +264,7 @@
   </p:defaultTextStyle>
   <p:extLst>
     <p:ext uri="{EFAFB233-063F-42B5-8137-9DF3F51BA10A}">
-      <p15:sldGuideLst xmlns="" xmlns:p15="http://schemas.microsoft.com/office/powerpoint/2012/main">
+      <p15:sldGuideLst xmlns:p15="http://schemas.microsoft.com/office/powerpoint/2012/main" xmlns="">
         <p15:guide id="1" orient="horz" pos="1620">
           <p15:clr>
             <a:srgbClr val="A4A3A4"/>
@@ -2762,7 +2764,7 @@
   <p:cSld>
     <p:spTree>
       <p:nvGrpSpPr>
-        <p:cNvPr id="1" name="Shape 218"/>
+        <p:cNvPr id="1" name="Shape 161"/>
         <p:cNvGrpSpPr/>
         <p:nvPr/>
       </p:nvGrpSpPr>
@@ -2776,7 +2778,7 @@
       </p:grpSpPr>
       <p:sp>
         <p:nvSpPr>
-          <p:cNvPr id="219" name="Shape 219"/>
+          <p:cNvPr id="162" name="Shape 162"/>
           <p:cNvSpPr>
             <a:spLocks noGrp="1" noRot="1" noChangeAspect="1"/>
           </p:cNvSpPr>
@@ -2827,7 +2829,7 @@
       </p:sp>
       <p:sp>
         <p:nvSpPr>
-          <p:cNvPr id="220" name="Shape 220"/>
+          <p:cNvPr id="163" name="Shape 163"/>
           <p:cNvSpPr txBox="1">
             <a:spLocks noGrp="1"/>
           </p:cNvSpPr>
@@ -2863,7 +2865,7 @@
     </p:spTree>
     <p:extLst>
       <p:ext uri="{BB962C8B-B14F-4D97-AF65-F5344CB8AC3E}">
-        <p14:creationId xmlns:p14="http://schemas.microsoft.com/office/powerpoint/2010/main" val="836918920"/>
+        <p14:creationId xmlns:p14="http://schemas.microsoft.com/office/powerpoint/2010/main" val="2127567739"/>
       </p:ext>
     </p:extLst>
   </p:cSld>
@@ -2878,7 +2880,7 @@
   <p:cSld>
     <p:spTree>
       <p:nvGrpSpPr>
-        <p:cNvPr id="1" name="Shape 224"/>
+        <p:cNvPr id="1" name="Shape 218"/>
         <p:cNvGrpSpPr/>
         <p:nvPr/>
       </p:nvGrpSpPr>
@@ -2892,7 +2894,7 @@
       </p:grpSpPr>
       <p:sp>
         <p:nvSpPr>
-          <p:cNvPr id="225" name="Shape 225"/>
+          <p:cNvPr id="219" name="Shape 219"/>
           <p:cNvSpPr>
             <a:spLocks noGrp="1" noRot="1" noChangeAspect="1"/>
           </p:cNvSpPr>
@@ -2943,7 +2945,7 @@
       </p:sp>
       <p:sp>
         <p:nvSpPr>
-          <p:cNvPr id="226" name="Shape 226"/>
+          <p:cNvPr id="220" name="Shape 220"/>
           <p:cNvSpPr txBox="1">
             <a:spLocks noGrp="1"/>
           </p:cNvSpPr>
@@ -2972,26 +2974,14 @@
               </a:spcBef>
               <a:buNone/>
             </a:pPr>
-            <a:r>
-              <a:rPr lang="en-US" dirty="0" smtClean="0"/>
-              <a:t>Security Assertion Markup Language is an XML-based open standard data format for exchanging authentication </a:t>
-            </a:r>
-            <a:r>
-              <a:rPr lang="en-US" dirty="0" err="1" smtClean="0"/>
-              <a:t>andauthorization</a:t>
-            </a:r>
-            <a:r>
-              <a:rPr lang="en-US" dirty="0" smtClean="0"/>
-              <a:t> data between parties, in particular, between an identity provider and a service provider. </a:t>
-            </a:r>
-            <a:endParaRPr dirty="0"/>
+            <a:endParaRPr/>
           </a:p>
         </p:txBody>
       </p:sp>
     </p:spTree>
     <p:extLst>
       <p:ext uri="{BB962C8B-B14F-4D97-AF65-F5344CB8AC3E}">
-        <p14:creationId xmlns:p14="http://schemas.microsoft.com/office/powerpoint/2010/main" val="2804019714"/>
+        <p14:creationId xmlns:p14="http://schemas.microsoft.com/office/powerpoint/2010/main" val="836918920"/>
       </p:ext>
     </p:extLst>
   </p:cSld>
@@ -3006,7 +2996,7 @@
   <p:cSld>
     <p:spTree>
       <p:nvGrpSpPr>
-        <p:cNvPr id="1" name="Shape 231"/>
+        <p:cNvPr id="1" name="Shape 224"/>
         <p:cNvGrpSpPr/>
         <p:nvPr/>
       </p:nvGrpSpPr>
@@ -3020,7 +3010,7 @@
       </p:grpSpPr>
       <p:sp>
         <p:nvSpPr>
-          <p:cNvPr id="232" name="Shape 232"/>
+          <p:cNvPr id="225" name="Shape 225"/>
           <p:cNvSpPr>
             <a:spLocks noGrp="1" noRot="1" noChangeAspect="1"/>
           </p:cNvSpPr>
@@ -3071,7 +3061,7 @@
       </p:sp>
       <p:sp>
         <p:nvSpPr>
-          <p:cNvPr id="233" name="Shape 233"/>
+          <p:cNvPr id="226" name="Shape 226"/>
           <p:cNvSpPr txBox="1">
             <a:spLocks noGrp="1"/>
           </p:cNvSpPr>
@@ -3100,14 +3090,26 @@
               </a:spcBef>
               <a:buNone/>
             </a:pPr>
-            <a:endParaRPr/>
+            <a:r>
+              <a:rPr lang="en-US" dirty="0" smtClean="0"/>
+              <a:t>Security Assertion Markup Language is an XML-based open standard data format for exchanging authentication </a:t>
+            </a:r>
+            <a:r>
+              <a:rPr lang="en-US" dirty="0" err="1" smtClean="0"/>
+              <a:t>andauthorization</a:t>
+            </a:r>
+            <a:r>
+              <a:rPr lang="en-US" dirty="0" smtClean="0"/>
+              <a:t> data between parties, in particular, between an identity provider and a service provider. </a:t>
+            </a:r>
+            <a:endParaRPr dirty="0"/>
           </a:p>
         </p:txBody>
       </p:sp>
     </p:spTree>
     <p:extLst>
       <p:ext uri="{BB962C8B-B14F-4D97-AF65-F5344CB8AC3E}">
-        <p14:creationId xmlns:p14="http://schemas.microsoft.com/office/powerpoint/2010/main" val="4293366839"/>
+        <p14:creationId xmlns:p14="http://schemas.microsoft.com/office/powerpoint/2010/main" val="2804019714"/>
       </p:ext>
     </p:extLst>
   </p:cSld>
@@ -3238,7 +3240,7 @@
   <p:cSld>
     <p:spTree>
       <p:nvGrpSpPr>
-        <p:cNvPr id="1" name="Shape 244"/>
+        <p:cNvPr id="1" name="Shape 231"/>
         <p:cNvGrpSpPr/>
         <p:nvPr/>
       </p:nvGrpSpPr>
@@ -3252,7 +3254,7 @@
       </p:grpSpPr>
       <p:sp>
         <p:nvSpPr>
-          <p:cNvPr id="245" name="Shape 245"/>
+          <p:cNvPr id="232" name="Shape 232"/>
           <p:cNvSpPr>
             <a:spLocks noGrp="1" noRot="1" noChangeAspect="1"/>
           </p:cNvSpPr>
@@ -3303,6 +3305,122 @@
       </p:sp>
       <p:sp>
         <p:nvSpPr>
+          <p:cNvPr id="233" name="Shape 233"/>
+          <p:cNvSpPr txBox="1">
+            <a:spLocks noGrp="1"/>
+          </p:cNvSpPr>
+          <p:nvPr>
+            <p:ph type="body" idx="1"/>
+          </p:nvPr>
+        </p:nvSpPr>
+        <p:spPr>
+          <a:xfrm>
+            <a:off x="685800" y="4343400"/>
+            <a:ext cx="5486399" cy="4114800"/>
+          </a:xfrm>
+          <a:prstGeom prst="rect">
+            <a:avLst/>
+          </a:prstGeom>
+        </p:spPr>
+        <p:txBody>
+          <a:bodyPr lIns="91425" tIns="91425" rIns="91425" bIns="91425" anchor="t" anchorCtr="0">
+            <a:noAutofit/>
+          </a:bodyPr>
+          <a:lstStyle/>
+          <a:p>
+            <a:pPr>
+              <a:spcBef>
+                <a:spcPts val="0"/>
+              </a:spcBef>
+              <a:buNone/>
+            </a:pPr>
+            <a:endParaRPr/>
+          </a:p>
+        </p:txBody>
+      </p:sp>
+    </p:spTree>
+    <p:extLst>
+      <p:ext uri="{BB962C8B-B14F-4D97-AF65-F5344CB8AC3E}">
+        <p14:creationId xmlns:p14="http://schemas.microsoft.com/office/powerpoint/2010/main" val="4293366839"/>
+      </p:ext>
+    </p:extLst>
+  </p:cSld>
+  <p:clrMapOvr>
+    <a:masterClrMapping/>
+  </p:clrMapOvr>
+</p:notes>
+</file>
+
+<file path=ppt/notesSlides/notesSlide31.xml><?xml version="1.0" encoding="utf-8"?>
+<p:notes xmlns:a="http://schemas.openxmlformats.org/drawingml/2006/main" xmlns:r="http://schemas.openxmlformats.org/officeDocument/2006/relationships" xmlns:p="http://schemas.openxmlformats.org/presentationml/2006/main" showMasterSp="0" showMasterPhAnim="0">
+  <p:cSld>
+    <p:spTree>
+      <p:nvGrpSpPr>
+        <p:cNvPr id="1" name="Shape 244"/>
+        <p:cNvGrpSpPr/>
+        <p:nvPr/>
+      </p:nvGrpSpPr>
+      <p:grpSpPr>
+        <a:xfrm>
+          <a:off x="0" y="0"/>
+          <a:ext cx="0" cy="0"/>
+          <a:chOff x="0" y="0"/>
+          <a:chExt cx="0" cy="0"/>
+        </a:xfrm>
+      </p:grpSpPr>
+      <p:sp>
+        <p:nvSpPr>
+          <p:cNvPr id="245" name="Shape 245"/>
+          <p:cNvSpPr>
+            <a:spLocks noGrp="1" noRot="1" noChangeAspect="1"/>
+          </p:cNvSpPr>
+          <p:nvPr>
+            <p:ph type="sldImg" idx="2"/>
+          </p:nvPr>
+        </p:nvSpPr>
+        <p:spPr>
+          <a:xfrm>
+            <a:off x="1143000" y="685800"/>
+            <a:ext cx="4572000" cy="3429000"/>
+          </a:xfrm>
+          <a:custGeom>
+            <a:avLst/>
+            <a:gdLst/>
+            <a:ahLst/>
+            <a:cxnLst/>
+            <a:rect l="0" t="0" r="0" b="0"/>
+            <a:pathLst>
+              <a:path w="120000" h="120000" extrusionOk="0">
+                <a:moveTo>
+                  <a:pt x="0" y="0"/>
+                </a:moveTo>
+                <a:lnTo>
+                  <a:pt x="120000" y="0"/>
+                </a:lnTo>
+                <a:lnTo>
+                  <a:pt x="120000" y="120000"/>
+                </a:lnTo>
+                <a:lnTo>
+                  <a:pt x="0" y="120000"/>
+                </a:lnTo>
+                <a:close/>
+              </a:path>
+            </a:pathLst>
+          </a:custGeom>
+          <a:noFill/>
+          <a:ln w="9525" cap="flat">
+            <a:solidFill>
+              <a:srgbClr val="000000"/>
+            </a:solidFill>
+            <a:prstDash val="solid"/>
+            <a:round/>
+            <a:headEnd type="none" w="med" len="med"/>
+            <a:tailEnd type="none" w="med" len="med"/>
+          </a:ln>
+        </p:spPr>
+      </p:sp>
+      <p:sp>
+        <p:nvSpPr>
           <p:cNvPr id="246" name="Shape 246"/>
           <p:cNvSpPr txBox="1">
             <a:spLocks noGrp="1"/>
@@ -3349,7 +3467,7 @@
 </p:notes>
 </file>
 
-<file path=ppt/notesSlides/notesSlide31.xml><?xml version="1.0" encoding="utf-8"?>
+<file path=ppt/notesSlides/notesSlide32.xml><?xml version="1.0" encoding="utf-8"?>
 <p:notes xmlns:a="http://schemas.openxmlformats.org/drawingml/2006/main" xmlns:r="http://schemas.openxmlformats.org/officeDocument/2006/relationships" xmlns:p="http://schemas.openxmlformats.org/presentationml/2006/main" showMasterSp="0" showMasterPhAnim="0">
   <p:cSld>
     <p:spTree>
@@ -9640,11 +9758,7 @@
             </a:pPr>
             <a:r>
               <a:rPr lang="en-US" sz="3200" dirty="0" smtClean="0"/>
-              <a:t>Sends the </a:t>
-            </a:r>
-            <a:r>
-              <a:rPr lang="en-US" sz="3200" dirty="0" smtClean="0"/>
-              <a:t>password</a:t>
+              <a:t>Sends the password</a:t>
             </a:r>
             <a:endParaRPr lang="en" sz="3200" dirty="0"/>
           </a:p>
@@ -9686,8 +9800,8 @@
         </p:nvSpPr>
         <p:spPr>
           <a:xfrm>
-            <a:off x="1757512" y="3420610"/>
-            <a:ext cx="5444437" cy="747897"/>
+            <a:off x="1540295" y="3454034"/>
+            <a:ext cx="6195972" cy="877163"/>
           </a:xfrm>
           <a:prstGeom prst="rect">
             <a:avLst/>
@@ -9702,33 +9816,41 @@
           <a:p>
             <a:pPr>
               <a:lnSpc>
-                <a:spcPct val="120000"/>
+                <a:spcPct val="130000"/>
               </a:lnSpc>
             </a:pPr>
             <a:r>
-              <a:rPr lang="en-US" sz="1800" dirty="0" smtClean="0"/>
+              <a:rPr lang="en-US" sz="2000" dirty="0" smtClean="0"/>
               <a:t>401 Unauthorized</a:t>
             </a:r>
           </a:p>
           <a:p>
             <a:pPr>
               <a:lnSpc>
-                <a:spcPct val="120000"/>
+                <a:spcPct val="130000"/>
               </a:lnSpc>
             </a:pPr>
             <a:r>
-              <a:rPr lang="en-US" sz="1800" dirty="0" smtClean="0"/>
-              <a:t>WWW-Authenticate: Basic Realm=“</a:t>
-            </a:r>
-            <a:r>
-              <a:rPr lang="en-US" sz="1800" dirty="0" err="1" smtClean="0"/>
+              <a:rPr lang="en-US" sz="2000" dirty="0" smtClean="0"/>
+              <a:t>WWW-Authenticate: Basic </a:t>
+            </a:r>
+            <a:r>
+              <a:rPr lang="en-US" sz="2000" dirty="0" smtClean="0"/>
+              <a:t>Realm=</a:t>
+            </a:r>
+            <a:r>
+              <a:rPr lang="en-US" sz="2000" dirty="0" smtClean="0"/>
+              <a:t>“</a:t>
+            </a:r>
+            <a:r>
+              <a:rPr lang="en-US" sz="2000" dirty="0" err="1" smtClean="0"/>
               <a:t>www.app.com</a:t>
             </a:r>
             <a:r>
-              <a:rPr lang="en-US" sz="1800" dirty="0" smtClean="0"/>
+              <a:rPr lang="en-US" sz="2000" dirty="0" smtClean="0"/>
               <a:t>”</a:t>
             </a:r>
-            <a:endParaRPr lang="en-US" sz="1800" dirty="0"/>
+            <a:endParaRPr lang="en-US" sz="2000" dirty="0"/>
           </a:p>
         </p:txBody>
       </p:sp>
@@ -9755,34 +9877,6 @@
           </a:p>
         </p:txBody>
       </p:sp>
-      <p:pic>
-        <p:nvPicPr>
-          <p:cNvPr id="4" name="Shape 183"/>
-          <p:cNvPicPr preferRelativeResize="0"/>
-          <p:nvPr/>
-        </p:nvPicPr>
-        <p:blipFill>
-          <a:blip r:embed="rId2">
-            <a:alphaModFix/>
-          </a:blip>
-          <a:stretch>
-            <a:fillRect/>
-          </a:stretch>
-        </p:blipFill>
-        <p:spPr>
-          <a:xfrm rot="10800000" flipH="1">
-            <a:off x="1296006" y="1487993"/>
-            <a:ext cx="788400" cy="1051232"/>
-          </a:xfrm>
-          <a:prstGeom prst="rect">
-            <a:avLst/>
-          </a:prstGeom>
-          <a:noFill/>
-          <a:ln>
-            <a:noFill/>
-          </a:ln>
-        </p:spPr>
-      </p:pic>
       <p:sp>
         <p:nvSpPr>
           <p:cNvPr id="5" name="Shape 179"/>
@@ -9791,7 +9885,7 @@
         </p:nvSpPr>
         <p:spPr>
           <a:xfrm>
-            <a:off x="6292785" y="1487995"/>
+            <a:off x="6526711" y="1487995"/>
             <a:ext cx="1848899" cy="869199"/>
           </a:xfrm>
           <a:prstGeom prst="roundRect">
@@ -9838,14 +9932,12 @@
       <p:cxnSp>
         <p:nvCxnSpPr>
           <p:cNvPr id="7" name="Straight Connector 6"/>
-          <p:cNvCxnSpPr>
-            <a:stCxn id="4" idx="0"/>
-          </p:cNvCxnSpPr>
+          <p:cNvCxnSpPr/>
           <p:nvPr/>
         </p:nvCxnSpPr>
         <p:spPr>
           <a:xfrm>
-            <a:off x="1690206" y="2539227"/>
+            <a:off x="1356026" y="2539227"/>
             <a:ext cx="0" cy="3916349"/>
           </a:xfrm>
           <a:prstGeom prst="line">
@@ -9883,7 +9975,7 @@
         </p:nvCxnSpPr>
         <p:spPr>
           <a:xfrm flipH="1">
-            <a:off x="7201946" y="2357194"/>
+            <a:off x="7435872" y="2357194"/>
             <a:ext cx="15286" cy="4098383"/>
           </a:xfrm>
           <a:prstGeom prst="line">
@@ -9919,8 +10011,8 @@
         </p:nvCxnSpPr>
         <p:spPr>
           <a:xfrm>
-            <a:off x="1693336" y="3051948"/>
-            <a:ext cx="5508613" cy="0"/>
+            <a:off x="1356026" y="3051948"/>
+            <a:ext cx="6079846" cy="0"/>
           </a:xfrm>
           <a:prstGeom prst="straightConnector1">
             <a:avLst/>
@@ -9952,8 +10044,8 @@
         </p:nvCxnSpPr>
         <p:spPr>
           <a:xfrm flipH="1">
-            <a:off x="1693336" y="3923643"/>
-            <a:ext cx="5508613" cy="0"/>
+            <a:off x="1356026" y="3923643"/>
+            <a:ext cx="6079846" cy="0"/>
           </a:xfrm>
           <a:prstGeom prst="straightConnector1">
             <a:avLst/>
@@ -9985,8 +10077,8 @@
         </p:nvCxnSpPr>
         <p:spPr>
           <a:xfrm>
-            <a:off x="1693336" y="5080620"/>
-            <a:ext cx="5508613" cy="0"/>
+            <a:off x="1356026" y="5080620"/>
+            <a:ext cx="6079846" cy="0"/>
           </a:xfrm>
           <a:prstGeom prst="straightConnector1">
             <a:avLst/>
@@ -10018,8 +10110,8 @@
         </p:nvCxnSpPr>
         <p:spPr>
           <a:xfrm flipH="1">
-            <a:off x="1693336" y="6170529"/>
-            <a:ext cx="5508613" cy="0"/>
+            <a:off x="1356026" y="6170529"/>
+            <a:ext cx="6079846" cy="0"/>
           </a:xfrm>
           <a:prstGeom prst="straightConnector1">
             <a:avLst/>
@@ -10051,8 +10143,8 @@
         </p:nvSpPr>
         <p:spPr>
           <a:xfrm>
-            <a:off x="1772868" y="2623065"/>
-            <a:ext cx="1986576" cy="369332"/>
+            <a:off x="1505524" y="2639777"/>
+            <a:ext cx="2504636" cy="400110"/>
           </a:xfrm>
           <a:prstGeom prst="rect">
             <a:avLst/>
@@ -10066,14 +10158,14 @@
           <a:lstStyle/>
           <a:p>
             <a:r>
-              <a:rPr lang="en-US" sz="1800" dirty="0" smtClean="0"/>
+              <a:rPr lang="en-US" sz="2000" dirty="0" smtClean="0"/>
               <a:t>GET /</a:t>
             </a:r>
             <a:r>
-              <a:rPr lang="en-US" sz="1800" dirty="0" err="1" smtClean="0"/>
+              <a:rPr lang="en-US" sz="2000" dirty="0" err="1" smtClean="0"/>
               <a:t>index.html</a:t>
             </a:r>
-            <a:endParaRPr lang="en-US" sz="1800" dirty="0"/>
+            <a:endParaRPr lang="en-US" sz="2000" dirty="0"/>
           </a:p>
         </p:txBody>
       </p:sp>
@@ -10085,8 +10177,8 @@
         </p:nvSpPr>
         <p:spPr>
           <a:xfrm>
-            <a:off x="1785426" y="4560815"/>
-            <a:ext cx="5192811" cy="747897"/>
+            <a:off x="1518082" y="4594239"/>
+            <a:ext cx="6201476" cy="877163"/>
           </a:xfrm>
           <a:prstGeom prst="rect">
             <a:avLst/>
@@ -10101,34 +10193,34 @@
           <a:p>
             <a:pPr>
               <a:lnSpc>
-                <a:spcPct val="120000"/>
+                <a:spcPct val="130000"/>
               </a:lnSpc>
             </a:pPr>
             <a:r>
-              <a:rPr lang="en-US" sz="1800" dirty="0" smtClean="0"/>
+              <a:rPr lang="en-US" sz="2000" dirty="0" smtClean="0"/>
               <a:t>GET /</a:t>
             </a:r>
             <a:r>
-              <a:rPr lang="en-US" sz="1800" dirty="0" err="1" smtClean="0"/>
+              <a:rPr lang="en-US" sz="2000" dirty="0" err="1" smtClean="0"/>
               <a:t>index.html</a:t>
             </a:r>
-            <a:endParaRPr lang="en-US" sz="1800" dirty="0" smtClean="0"/>
+            <a:endParaRPr lang="en-US" sz="2000" dirty="0" smtClean="0"/>
           </a:p>
           <a:p>
             <a:pPr>
               <a:lnSpc>
-                <a:spcPct val="120000"/>
+                <a:spcPct val="130000"/>
               </a:lnSpc>
             </a:pPr>
             <a:r>
-              <a:rPr lang="en-US" sz="1800" dirty="0" smtClean="0"/>
+              <a:rPr lang="en-US" sz="2000" dirty="0" smtClean="0"/>
               <a:t>Authorization: Basic </a:t>
             </a:r>
             <a:r>
-              <a:rPr lang="en" sz="1800" dirty="0"/>
+              <a:rPr lang="en" sz="2000" dirty="0"/>
               <a:t>YWRtaW46cEBzc3cwcmQ=</a:t>
             </a:r>
-            <a:endParaRPr lang="en-US" sz="1800" dirty="0"/>
+            <a:endParaRPr lang="en-US" sz="2000" dirty="0"/>
           </a:p>
         </p:txBody>
       </p:sp>
@@ -10140,8 +10232,8 @@
         </p:nvSpPr>
         <p:spPr>
           <a:xfrm>
-            <a:off x="1820376" y="5751329"/>
-            <a:ext cx="967445" cy="369332"/>
+            <a:off x="1553032" y="5784753"/>
+            <a:ext cx="1054420" cy="400110"/>
           </a:xfrm>
           <a:prstGeom prst="rect">
             <a:avLst/>
@@ -10155,13 +10247,43 @@
           <a:lstStyle/>
           <a:p>
             <a:r>
-              <a:rPr lang="en-US" sz="1800" dirty="0" smtClean="0"/>
+              <a:rPr lang="en-US" sz="2000" dirty="0" smtClean="0"/>
               <a:t>200 OK</a:t>
             </a:r>
-            <a:endParaRPr lang="en-US" sz="1800" dirty="0"/>
+            <a:endParaRPr lang="en-US" sz="2000" dirty="0"/>
           </a:p>
         </p:txBody>
       </p:sp>
+      <p:pic>
+        <p:nvPicPr>
+          <p:cNvPr id="3" name="Picture 2" descr="chrome.png"/>
+          <p:cNvPicPr>
+            <a:picLocks noChangeAspect="1"/>
+          </p:cNvPicPr>
+          <p:nvPr/>
+        </p:nvPicPr>
+        <p:blipFill>
+          <a:blip r:embed="rId2">
+            <a:extLst>
+              <a:ext uri="{28A0092B-C50C-407E-A947-70E740481C1C}">
+                <a14:useLocalDpi xmlns:a14="http://schemas.microsoft.com/office/drawing/2010/main" val="0"/>
+              </a:ext>
+            </a:extLst>
+          </a:blip>
+          <a:stretch>
+            <a:fillRect/>
+          </a:stretch>
+        </p:blipFill>
+        <p:spPr>
+          <a:xfrm>
+            <a:off x="785322" y="1362609"/>
+            <a:ext cx="1156405" cy="1156405"/>
+          </a:xfrm>
+          <a:prstGeom prst="rect">
+            <a:avLst/>
+          </a:prstGeom>
+        </p:spPr>
+      </p:pic>
     </p:spTree>
     <p:extLst>
       <p:ext uri="{BB962C8B-B14F-4D97-AF65-F5344CB8AC3E}">
@@ -10645,182 +10767,6 @@
           </a:p>
         </p:txBody>
       </p:sp>
-      <p:grpSp>
-        <p:nvGrpSpPr>
-          <p:cNvPr id="48" name="Shape 48"/>
-          <p:cNvGrpSpPr>
-            <a:grpSpLocks noChangeAspect="1"/>
-          </p:cNvGrpSpPr>
-          <p:nvPr/>
-        </p:nvGrpSpPr>
-        <p:grpSpPr>
-          <a:xfrm>
-            <a:off x="457203" y="1854733"/>
-            <a:ext cx="2426625" cy="3983667"/>
-            <a:chOff x="1052725" y="1434475"/>
-            <a:chExt cx="2426625" cy="2987750"/>
-          </a:xfrm>
-        </p:grpSpPr>
-        <p:sp>
-          <p:nvSpPr>
-            <p:cNvPr id="49" name="Shape 49"/>
-            <p:cNvSpPr/>
-            <p:nvPr/>
-          </p:nvSpPr>
-          <p:spPr>
-            <a:xfrm>
-              <a:off x="1172950" y="1513725"/>
-              <a:ext cx="2306400" cy="2908500"/>
-            </a:xfrm>
-            <a:prstGeom prst="rect">
-              <a:avLst/>
-            </a:prstGeom>
-            <a:solidFill>
-              <a:srgbClr val="999999"/>
-            </a:solidFill>
-            <a:ln w="19050" cap="flat">
-              <a:solidFill>
-                <a:schemeClr val="dk2"/>
-              </a:solidFill>
-              <a:prstDash val="solid"/>
-              <a:round/>
-              <a:headEnd type="none" w="med" len="med"/>
-              <a:tailEnd type="none" w="med" len="med"/>
-            </a:ln>
-          </p:spPr>
-          <p:txBody>
-            <a:bodyPr lIns="91425" tIns="91425" rIns="91425" bIns="91425" anchor="ctr" anchorCtr="0">
-              <a:noAutofit/>
-            </a:bodyPr>
-            <a:lstStyle/>
-            <a:p>
-              <a:pPr>
-                <a:spcBef>
-                  <a:spcPts val="0"/>
-                </a:spcBef>
-                <a:buNone/>
-              </a:pPr>
-              <a:endParaRPr/>
-            </a:p>
-          </p:txBody>
-        </p:sp>
-        <p:pic>
-          <p:nvPicPr>
-            <p:cNvPr id="50" name="Shape 50"/>
-            <p:cNvPicPr preferRelativeResize="0"/>
-            <p:nvPr/>
-          </p:nvPicPr>
-          <p:blipFill>
-            <a:blip r:embed="rId3">
-              <a:alphaModFix/>
-            </a:blip>
-            <a:stretch>
-              <a:fillRect/>
-            </a:stretch>
-          </p:blipFill>
-          <p:spPr>
-            <a:xfrm>
-              <a:off x="1052725" y="1434475"/>
-              <a:ext cx="2393699" cy="2947900"/>
-            </a:xfrm>
-            <a:prstGeom prst="rect">
-              <a:avLst/>
-            </a:prstGeom>
-            <a:noFill/>
-            <a:ln>
-              <a:noFill/>
-            </a:ln>
-          </p:spPr>
-        </p:pic>
-      </p:grpSp>
-      <p:grpSp>
-        <p:nvGrpSpPr>
-          <p:cNvPr id="51" name="Shape 51"/>
-          <p:cNvGrpSpPr>
-            <a:grpSpLocks noChangeAspect="1"/>
-          </p:cNvGrpSpPr>
-          <p:nvPr/>
-        </p:nvGrpSpPr>
-        <p:grpSpPr>
-          <a:xfrm>
-            <a:off x="5793803" y="2700735"/>
-            <a:ext cx="1571325" cy="2088465"/>
-            <a:chOff x="6251000" y="1873150"/>
-            <a:chExt cx="1571325" cy="1566349"/>
-          </a:xfrm>
-        </p:grpSpPr>
-        <p:sp>
-          <p:nvSpPr>
-            <p:cNvPr id="52" name="Shape 52"/>
-            <p:cNvSpPr/>
-            <p:nvPr/>
-          </p:nvSpPr>
-          <p:spPr>
-            <a:xfrm>
-              <a:off x="6348125" y="1971000"/>
-              <a:ext cx="1474200" cy="1468499"/>
-            </a:xfrm>
-            <a:prstGeom prst="rect">
-              <a:avLst/>
-            </a:prstGeom>
-            <a:solidFill>
-              <a:srgbClr val="999999"/>
-            </a:solidFill>
-            <a:ln w="19050" cap="flat">
-              <a:solidFill>
-                <a:srgbClr val="000000"/>
-              </a:solidFill>
-              <a:prstDash val="solid"/>
-              <a:round/>
-              <a:headEnd type="none" w="med" len="med"/>
-              <a:tailEnd type="none" w="med" len="med"/>
-            </a:ln>
-          </p:spPr>
-          <p:txBody>
-            <a:bodyPr lIns="91425" tIns="91425" rIns="91425" bIns="91425" anchor="ctr" anchorCtr="0">
-              <a:noAutofit/>
-            </a:bodyPr>
-            <a:lstStyle/>
-            <a:p>
-              <a:pPr>
-                <a:spcBef>
-                  <a:spcPts val="0"/>
-                </a:spcBef>
-                <a:buNone/>
-              </a:pPr>
-              <a:endParaRPr/>
-            </a:p>
-          </p:txBody>
-        </p:sp>
-        <p:pic>
-          <p:nvPicPr>
-            <p:cNvPr id="53" name="Shape 53"/>
-            <p:cNvPicPr preferRelativeResize="0"/>
-            <p:nvPr/>
-          </p:nvPicPr>
-          <p:blipFill>
-            <a:blip r:embed="rId4">
-              <a:alphaModFix/>
-            </a:blip>
-            <a:stretch>
-              <a:fillRect/>
-            </a:stretch>
-          </p:blipFill>
-          <p:spPr>
-            <a:xfrm>
-              <a:off x="6251000" y="1873150"/>
-              <a:ext cx="1524000" cy="1524000"/>
-            </a:xfrm>
-            <a:prstGeom prst="rect">
-              <a:avLst/>
-            </a:prstGeom>
-            <a:noFill/>
-            <a:ln>
-              <a:noFill/>
-            </a:ln>
-          </p:spPr>
-        </p:pic>
-      </p:grpSp>
       <p:sp>
         <p:nvSpPr>
           <p:cNvPr id="54" name="Shape 54"/>
@@ -10907,6 +10853,80 @@
           </a:p>
         </p:txBody>
       </p:sp>
+      <p:pic>
+        <p:nvPicPr>
+          <p:cNvPr id="2" name="Picture 1" descr="abpsmall.jpg"/>
+          <p:cNvPicPr>
+            <a:picLocks noChangeAspect="1"/>
+          </p:cNvPicPr>
+          <p:nvPr/>
+        </p:nvPicPr>
+        <p:blipFill>
+          <a:blip r:embed="rId3">
+            <a:extLst>
+              <a:ext uri="{28A0092B-C50C-407E-A947-70E740481C1C}">
+                <a14:useLocalDpi xmlns:a14="http://schemas.microsoft.com/office/drawing/2010/main" val="0"/>
+              </a:ext>
+            </a:extLst>
+          </a:blip>
+          <a:stretch>
+            <a:fillRect/>
+          </a:stretch>
+        </p:blipFill>
+        <p:spPr>
+          <a:xfrm>
+            <a:off x="667379" y="1671153"/>
+            <a:ext cx="3299842" cy="4063845"/>
+          </a:xfrm>
+          <a:prstGeom prst="rect">
+            <a:avLst/>
+          </a:prstGeom>
+          <a:effectLst>
+            <a:outerShdw blurRad="50800" dist="38100" dir="2700000" algn="tl" rotWithShape="0">
+              <a:prstClr val="black">
+                <a:alpha val="40000"/>
+              </a:prstClr>
+            </a:outerShdw>
+          </a:effectLst>
+        </p:spPr>
+      </p:pic>
+      <p:pic>
+        <p:nvPicPr>
+          <p:cNvPr id="3" name="Picture 2" descr="hp.jpeg"/>
+          <p:cNvPicPr>
+            <a:picLocks noChangeAspect="1"/>
+          </p:cNvPicPr>
+          <p:nvPr/>
+        </p:nvPicPr>
+        <p:blipFill>
+          <a:blip r:embed="rId4">
+            <a:extLst>
+              <a:ext uri="{28A0092B-C50C-407E-A947-70E740481C1C}">
+                <a14:useLocalDpi xmlns:a14="http://schemas.microsoft.com/office/drawing/2010/main" val="0"/>
+              </a:ext>
+            </a:extLst>
+          </a:blip>
+          <a:stretch>
+            <a:fillRect/>
+          </a:stretch>
+        </p:blipFill>
+        <p:spPr>
+          <a:xfrm>
+            <a:off x="5588000" y="2413000"/>
+            <a:ext cx="2032000" cy="2032000"/>
+          </a:xfrm>
+          <a:prstGeom prst="rect">
+            <a:avLst/>
+          </a:prstGeom>
+          <a:effectLst>
+            <a:outerShdw blurRad="50800" dist="38100" dir="2700000" algn="tl" rotWithShape="0">
+              <a:prstClr val="black">
+                <a:alpha val="40000"/>
+              </a:prstClr>
+            </a:outerShdw>
+          </a:effectLst>
+        </p:spPr>
+      </p:pic>
     </p:spTree>
   </p:cSld>
   <p:clrMapOvr>
@@ -10943,8 +10963,8 @@
         </p:nvSpPr>
         <p:spPr>
           <a:xfrm>
-            <a:off x="1106483" y="4393134"/>
-            <a:ext cx="7504881" cy="978730"/>
+            <a:off x="1106483" y="4409846"/>
+            <a:ext cx="7504881" cy="1231106"/>
           </a:xfrm>
           <a:prstGeom prst="rect">
             <a:avLst/>
@@ -10961,21 +10981,28 @@
               <a:lnSpc>
                 <a:spcPct val="120000"/>
               </a:lnSpc>
-            </a:pPr>
-            <a:r>
-              <a:rPr lang="en-US" sz="1800" dirty="0" smtClean="0"/>
+              <a:spcBef>
+                <a:spcPts val="1200"/>
+              </a:spcBef>
+            </a:pPr>
+            <a:r>
+              <a:rPr lang="en-US" sz="2000" dirty="0" smtClean="0"/>
               <a:t>GET /</a:t>
             </a:r>
             <a:r>
-              <a:rPr lang="en-US" sz="1800" dirty="0" err="1" smtClean="0"/>
+              <a:rPr lang="en-US" sz="2000" dirty="0" err="1" smtClean="0"/>
               <a:t>index.html</a:t>
             </a:r>
-            <a:endParaRPr lang="en-US" sz="1800" dirty="0" smtClean="0"/>
-          </a:p>
-          <a:p>
-            <a:pPr lvl="0"/>
-            <a:r>
-              <a:rPr lang="en" sz="1800" dirty="0"/>
+            <a:endParaRPr lang="en-US" sz="2000" dirty="0" smtClean="0"/>
+          </a:p>
+          <a:p>
+            <a:pPr lvl="0">
+              <a:spcBef>
+                <a:spcPts val="1200"/>
+              </a:spcBef>
+            </a:pPr>
+            <a:r>
+              <a:rPr lang="en" sz="2000" dirty="0"/>
               <a:t>Authorization: Digest username="%s", realm="%s", nonce="%s", opaque="%s", uri="%s", response="%s"</a:t>
             </a:r>
           </a:p>
@@ -10989,8 +11016,8 @@
         </p:nvSpPr>
         <p:spPr>
           <a:xfrm>
-            <a:off x="1154007" y="3320002"/>
-            <a:ext cx="6929291" cy="747897"/>
+            <a:off x="1154007" y="3353426"/>
+            <a:ext cx="7532793" cy="877163"/>
           </a:xfrm>
           <a:prstGeom prst="rect">
             <a:avLst/>
@@ -11005,25 +11032,25 @@
           <a:p>
             <a:pPr>
               <a:lnSpc>
-                <a:spcPct val="120000"/>
+                <a:spcPct val="130000"/>
               </a:lnSpc>
             </a:pPr>
             <a:r>
-              <a:rPr lang="en-US" sz="1800" dirty="0" smtClean="0"/>
+              <a:rPr lang="en-US" sz="2000" dirty="0" smtClean="0"/>
               <a:t>401 Unauthorized</a:t>
             </a:r>
           </a:p>
           <a:p>
             <a:pPr>
               <a:lnSpc>
-                <a:spcPct val="120000"/>
+                <a:spcPct val="130000"/>
               </a:lnSpc>
             </a:pPr>
             <a:r>
-              <a:rPr lang="en-US" sz="1800" dirty="0" smtClean="0"/>
+              <a:rPr lang="en-US" sz="2000" dirty="0" smtClean="0"/>
               <a:t>WWW-Authenticate: Digest realm=“x”, nonce=“y”, opaque=“z”</a:t>
             </a:r>
-            <a:endParaRPr lang="en-US" sz="1800" dirty="0"/>
+            <a:endParaRPr lang="en-US" sz="2000" dirty="0"/>
           </a:p>
         </p:txBody>
       </p:sp>
@@ -11050,34 +11077,6 @@
           </a:p>
         </p:txBody>
       </p:sp>
-      <p:pic>
-        <p:nvPicPr>
-          <p:cNvPr id="4" name="Shape 183"/>
-          <p:cNvPicPr preferRelativeResize="0"/>
-          <p:nvPr/>
-        </p:nvPicPr>
-        <p:blipFill>
-          <a:blip r:embed="rId2">
-            <a:alphaModFix/>
-          </a:blip>
-          <a:stretch>
-            <a:fillRect/>
-          </a:stretch>
-        </p:blipFill>
-        <p:spPr>
-          <a:xfrm rot="10800000" flipH="1">
-            <a:off x="692502" y="1487993"/>
-            <a:ext cx="788400" cy="1051232"/>
-          </a:xfrm>
-          <a:prstGeom prst="rect">
-            <a:avLst/>
-          </a:prstGeom>
-          <a:noFill/>
-          <a:ln>
-            <a:noFill/>
-          </a:ln>
-        </p:spPr>
-      </p:pic>
       <p:sp>
         <p:nvSpPr>
           <p:cNvPr id="5" name="Shape 179"/>
@@ -11133,14 +11132,12 @@
       <p:cxnSp>
         <p:nvCxnSpPr>
           <p:cNvPr id="7" name="Straight Connector 6"/>
-          <p:cNvCxnSpPr>
-            <a:stCxn id="4" idx="0"/>
-          </p:cNvCxnSpPr>
+          <p:cNvCxnSpPr/>
           <p:nvPr/>
         </p:nvCxnSpPr>
         <p:spPr>
           <a:xfrm>
-            <a:off x="1086702" y="2539227"/>
+            <a:off x="1053284" y="2539227"/>
             <a:ext cx="0" cy="3916349"/>
           </a:xfrm>
           <a:prstGeom prst="line">
@@ -11346,8 +11343,8 @@
         </p:nvSpPr>
         <p:spPr>
           <a:xfrm>
-            <a:off x="1169364" y="2623065"/>
-            <a:ext cx="1986576" cy="369332"/>
+            <a:off x="1169363" y="2623065"/>
+            <a:ext cx="2423071" cy="400110"/>
           </a:xfrm>
           <a:prstGeom prst="rect">
             <a:avLst/>
@@ -11361,14 +11358,14 @@
           <a:lstStyle/>
           <a:p>
             <a:r>
-              <a:rPr lang="en-US" sz="1800" dirty="0" smtClean="0"/>
+              <a:rPr lang="en-US" sz="2000" dirty="0" smtClean="0"/>
               <a:t>GET /</a:t>
             </a:r>
             <a:r>
-              <a:rPr lang="en-US" sz="1800" dirty="0" err="1" smtClean="0"/>
+              <a:rPr lang="en-US" sz="2000" dirty="0" err="1" smtClean="0"/>
               <a:t>index.html</a:t>
             </a:r>
-            <a:endParaRPr lang="en-US" sz="1800" dirty="0"/>
+            <a:endParaRPr lang="en-US" sz="2000" dirty="0"/>
           </a:p>
         </p:txBody>
       </p:sp>
@@ -11381,7 +11378,7 @@
         <p:spPr>
           <a:xfrm>
             <a:off x="1141434" y="5801633"/>
-            <a:ext cx="967445" cy="369332"/>
+            <a:ext cx="1054420" cy="400110"/>
           </a:xfrm>
           <a:prstGeom prst="rect">
             <a:avLst/>
@@ -11395,13 +11392,43 @@
           <a:lstStyle/>
           <a:p>
             <a:r>
-              <a:rPr lang="en-US" sz="1800" dirty="0" smtClean="0"/>
+              <a:rPr lang="en-US" sz="2000" dirty="0" smtClean="0"/>
               <a:t>200 OK</a:t>
             </a:r>
-            <a:endParaRPr lang="en-US" sz="1800" dirty="0"/>
+            <a:endParaRPr lang="en-US" sz="2000" dirty="0"/>
           </a:p>
         </p:txBody>
       </p:sp>
+      <p:pic>
+        <p:nvPicPr>
+          <p:cNvPr id="16" name="Picture 15" descr="chrome.png"/>
+          <p:cNvPicPr>
+            <a:picLocks noChangeAspect="1"/>
+          </p:cNvPicPr>
+          <p:nvPr/>
+        </p:nvPicPr>
+        <p:blipFill>
+          <a:blip r:embed="rId2">
+            <a:extLst>
+              <a:ext uri="{28A0092B-C50C-407E-A947-70E740481C1C}">
+                <a14:useLocalDpi xmlns:a14="http://schemas.microsoft.com/office/drawing/2010/main" val="0"/>
+              </a:ext>
+            </a:extLst>
+          </a:blip>
+          <a:stretch>
+            <a:fillRect/>
+          </a:stretch>
+        </p:blipFill>
+        <p:spPr>
+          <a:xfrm>
+            <a:off x="475081" y="1379321"/>
+            <a:ext cx="1156405" cy="1156405"/>
+          </a:xfrm>
+          <a:prstGeom prst="rect">
+            <a:avLst/>
+          </a:prstGeom>
+        </p:spPr>
+      </p:pic>
     </p:spTree>
     <p:extLst>
       <p:ext uri="{BB962C8B-B14F-4D97-AF65-F5344CB8AC3E}">
@@ -11503,8 +11530,22 @@
             </a:pPr>
             <a:r>
               <a:rPr lang="en" sz="3200" dirty="0"/>
-              <a:t>Server sends nonce, opaque and realm</a:t>
-            </a:r>
+              <a:t>Server sends nonce, opaque and </a:t>
+            </a:r>
+            <a:r>
+              <a:rPr lang="en" sz="3200" dirty="0" smtClean="0"/>
+              <a:t>realm</a:t>
+            </a:r>
+            <a:endParaRPr lang="en-US" sz="3200" dirty="0" smtClean="0"/>
+          </a:p>
+          <a:p>
+            <a:pPr lvl="0" rtl="0">
+              <a:spcBef>
+                <a:spcPts val="0"/>
+              </a:spcBef>
+              <a:buNone/>
+            </a:pPr>
+            <a:endParaRPr lang="en" sz="3200" dirty="0"/>
           </a:p>
           <a:p>
             <a:pPr lvl="0" rtl="0">
@@ -11577,8 +11618,8 @@
         </p:nvSpPr>
         <p:spPr>
           <a:xfrm>
-            <a:off x="234303" y="5377200"/>
-            <a:ext cx="8675399" cy="853200"/>
+            <a:off x="818741" y="5377200"/>
+            <a:ext cx="8090961" cy="853200"/>
           </a:xfrm>
           <a:prstGeom prst="rect">
             <a:avLst/>
@@ -12021,11 +12062,7 @@
             </a:pPr>
             <a:r>
               <a:rPr lang="en-US" sz="3200" dirty="0" smtClean="0"/>
-              <a:t>Apache </a:t>
-            </a:r>
-            <a:r>
-              <a:rPr lang="en-US" sz="3200" dirty="0" smtClean="0"/>
-              <a:t>client, not </a:t>
+              <a:t>Apache client, not </a:t>
             </a:r>
             <a:r>
               <a:rPr lang="en-US" sz="3200" dirty="0" err="1" smtClean="0"/>
@@ -12635,22 +12672,70 @@
               <a:buNone/>
             </a:pPr>
             <a:r>
-              <a:rPr lang="en" dirty="0" smtClean="0"/>
+              <a:rPr lang="en" sz="4000" dirty="0" smtClean="0"/>
               <a:t>OAuth</a:t>
             </a:r>
-            <a:endParaRPr lang="en" dirty="0"/>
+            <a:endParaRPr lang="en" sz="4000" dirty="0"/>
+          </a:p>
+        </p:txBody>
+      </p:sp>
+      <p:sp>
+        <p:nvSpPr>
+          <p:cNvPr id="173" name="Shape 173"/>
+          <p:cNvSpPr txBox="1">
+            <a:spLocks noGrp="1"/>
+          </p:cNvSpPr>
+          <p:nvPr>
+            <p:ph type="body" idx="1"/>
+          </p:nvPr>
+        </p:nvSpPr>
+        <p:spPr>
+          <a:xfrm>
+            <a:off x="1340924" y="5625435"/>
+            <a:ext cx="6191400" cy="942399"/>
+          </a:xfrm>
+          <a:prstGeom prst="rect">
+            <a:avLst/>
+          </a:prstGeom>
+        </p:spPr>
+        <p:txBody>
+          <a:bodyPr lIns="91425" tIns="91425" rIns="91425" bIns="91425" anchor="b" anchorCtr="0">
+            <a:noAutofit/>
+          </a:bodyPr>
+          <a:lstStyle/>
+          <a:p>
+            <a:pPr lvl="0" algn="ctr" rtl="0">
+              <a:spcBef>
+                <a:spcPts val="0"/>
+              </a:spcBef>
+              <a:buNone/>
+            </a:pPr>
+            <a:r>
+              <a:rPr lang="en" sz="2800" dirty="0">
+                <a:solidFill>
+                  <a:srgbClr val="444444"/>
+                </a:solidFill>
+              </a:rPr>
+              <a:t>the code is more what you'd call "guidelines" than actual rules</a:t>
+            </a:r>
           </a:p>
         </p:txBody>
       </p:sp>
       <p:pic>
         <p:nvPicPr>
-          <p:cNvPr id="172" name="Shape 172"/>
-          <p:cNvPicPr preferRelativeResize="0"/>
+          <p:cNvPr id="2" name="Picture 1" descr="captain-hector-barbossa-captain-jack-2536642-1600x1200 (1).jpg"/>
+          <p:cNvPicPr>
+            <a:picLocks noChangeAspect="1"/>
+          </p:cNvPicPr>
           <p:nvPr/>
         </p:nvPicPr>
         <p:blipFill>
           <a:blip r:embed="rId4">
-            <a:alphaModFix/>
+            <a:extLst>
+              <a:ext uri="{28A0092B-C50C-407E-A947-70E740481C1C}">
+                <a14:useLocalDpi xmlns:a14="http://schemas.microsoft.com/office/drawing/2010/main" val="0"/>
+              </a:ext>
+            </a:extLst>
           </a:blip>
           <a:stretch>
             <a:fillRect/>
@@ -12658,16 +12743,12 @@
         </p:blipFill>
         <p:spPr>
           <a:xfrm>
-            <a:off x="1870459" y="1343865"/>
-            <a:ext cx="4530806" cy="4016691"/>
+            <a:off x="2021788" y="1534821"/>
+            <a:ext cx="5050295" cy="3787721"/>
           </a:xfrm>
           <a:prstGeom prst="rect">
             <a:avLst/>
           </a:prstGeom>
-          <a:noFill/>
-          <a:ln>
-            <a:noFill/>
-          </a:ln>
           <a:effectLst>
             <a:outerShdw blurRad="50800" dist="38100" dir="2700000" algn="tl" rotWithShape="0">
               <a:prstClr val="black">
@@ -12675,57 +12756,8 @@
               </a:prstClr>
             </a:outerShdw>
           </a:effectLst>
-          <a:scene3d>
-            <a:camera prst="orthographicFront"/>
-            <a:lightRig rig="threePt" dir="t"/>
-          </a:scene3d>
-          <a:sp3d>
-            <a:bevelT/>
-          </a:sp3d>
         </p:spPr>
       </p:pic>
-      <p:sp>
-        <p:nvSpPr>
-          <p:cNvPr id="173" name="Shape 173"/>
-          <p:cNvSpPr txBox="1">
-            <a:spLocks noGrp="1"/>
-          </p:cNvSpPr>
-          <p:nvPr>
-            <p:ph type="body" idx="1"/>
-          </p:nvPr>
-        </p:nvSpPr>
-        <p:spPr>
-          <a:xfrm>
-            <a:off x="1040162" y="5625435"/>
-            <a:ext cx="6191400" cy="942399"/>
-          </a:xfrm>
-          <a:prstGeom prst="rect">
-            <a:avLst/>
-          </a:prstGeom>
-        </p:spPr>
-        <p:txBody>
-          <a:bodyPr lIns="91425" tIns="91425" rIns="91425" bIns="91425" anchor="b" anchorCtr="0">
-            <a:noAutofit/>
-          </a:bodyPr>
-          <a:lstStyle/>
-          <a:p>
-            <a:pPr lvl="0" algn="ctr" rtl="0">
-              <a:spcBef>
-                <a:spcPts val="0"/>
-              </a:spcBef>
-              <a:buNone/>
-            </a:pPr>
-            <a:r>
-              <a:rPr lang="en" sz="2400">
-                <a:solidFill>
-                  <a:srgbClr val="444444"/>
-                </a:solidFill>
-              </a:rPr>
-              <a:t>the code is more what you'd call "guidelines" than actual rules</a:t>
-            </a:r>
-          </a:p>
-        </p:txBody>
-      </p:sp>
     </p:spTree>
   </p:cSld>
   <p:clrMapOvr>
@@ -13044,7 +13076,7 @@
               <a:buNone/>
             </a:pPr>
             <a:r>
-              <a:rPr lang="en">
+              <a:rPr lang="en" sz="1800" dirty="0">
                 <a:solidFill>
                   <a:srgbClr val="FFFFFF"/>
                 </a:solidFill>
@@ -13096,7 +13128,7 @@
               <a:buNone/>
             </a:pPr>
             <a:r>
-              <a:rPr lang="en">
+              <a:rPr lang="en" sz="1800">
                 <a:solidFill>
                   <a:srgbClr val="FFFFFF"/>
                 </a:solidFill>
@@ -13162,40 +13194,10 @@
           </a:ln>
         </p:spPr>
       </p:cxnSp>
-      <p:pic>
-        <p:nvPicPr>
-          <p:cNvPr id="183" name="Shape 183"/>
-          <p:cNvPicPr preferRelativeResize="0"/>
-          <p:nvPr/>
-        </p:nvPicPr>
-        <p:blipFill>
-          <a:blip r:embed="rId3">
-            <a:alphaModFix/>
-          </a:blip>
-          <a:stretch>
-            <a:fillRect/>
-          </a:stretch>
-        </p:blipFill>
-        <p:spPr>
-          <a:xfrm rot="10800000" flipH="1">
-            <a:off x="599425" y="1457561"/>
-            <a:ext cx="788400" cy="1051232"/>
-          </a:xfrm>
-          <a:prstGeom prst="rect">
-            <a:avLst/>
-          </a:prstGeom>
-          <a:noFill/>
-          <a:ln>
-            <a:noFill/>
-          </a:ln>
-        </p:spPr>
-      </p:pic>
       <p:cxnSp>
         <p:nvCxnSpPr>
           <p:cNvPr id="184" name="Shape 184"/>
-          <p:cNvCxnSpPr>
-            <a:stCxn id="183" idx="0"/>
-          </p:cNvCxnSpPr>
+          <p:cNvCxnSpPr/>
           <p:nvPr/>
         </p:nvCxnSpPr>
         <p:spPr>
@@ -13226,8 +13228,8 @@
         </p:nvSpPr>
         <p:spPr>
           <a:xfrm>
-            <a:off x="1567816" y="2293500"/>
-            <a:ext cx="1958099" cy="474000"/>
+            <a:off x="1567816" y="2360348"/>
+            <a:ext cx="2408926" cy="474000"/>
           </a:xfrm>
           <a:prstGeom prst="rect">
             <a:avLst/>
@@ -13250,7 +13252,7 @@
               <a:buNone/>
             </a:pPr>
             <a:r>
-              <a:rPr lang="en-US" sz="1800" dirty="0" smtClean="0">
+              <a:rPr lang="en-US" sz="2000" dirty="0" smtClean="0">
                 <a:solidFill>
                   <a:schemeClr val="tx1"/>
                 </a:solidFill>
@@ -13258,14 +13260,14 @@
               <a:t>GET /</a:t>
             </a:r>
             <a:r>
-              <a:rPr lang="en-US" sz="1800" dirty="0" err="1" smtClean="0">
+              <a:rPr lang="en-US" sz="2000" dirty="0" err="1" smtClean="0">
                 <a:solidFill>
                   <a:schemeClr val="tx1"/>
                 </a:solidFill>
               </a:rPr>
               <a:t>index.html</a:t>
             </a:r>
-            <a:endParaRPr lang="en" sz="1800" dirty="0">
+            <a:endParaRPr lang="en" sz="2000" dirty="0">
               <a:solidFill>
                 <a:schemeClr val="tx1"/>
               </a:solidFill>
@@ -13281,7 +13283,7 @@
         </p:nvSpPr>
         <p:spPr>
           <a:xfrm>
-            <a:off x="1265211" y="2857800"/>
+            <a:off x="1148248" y="2924648"/>
             <a:ext cx="3460799" cy="347600"/>
           </a:xfrm>
           <a:prstGeom prst="rect">
@@ -13305,7 +13307,7 @@
               <a:buNone/>
             </a:pPr>
             <a:r>
-              <a:rPr lang="en" sz="1800" dirty="0">
+              <a:rPr lang="en" sz="2000" dirty="0">
                 <a:solidFill>
                   <a:schemeClr val="tx1"/>
                 </a:solidFill>
@@ -13313,7 +13315,7 @@
               <a:t>302 Redirect to </a:t>
             </a:r>
             <a:r>
-              <a:rPr lang="en" sz="1800" dirty="0" smtClean="0">
+              <a:rPr lang="en" sz="2000" dirty="0" smtClean="0">
                 <a:solidFill>
                   <a:schemeClr val="tx1"/>
                 </a:solidFill>
@@ -13321,14 +13323,14 @@
               <a:t>Service</a:t>
             </a:r>
             <a:r>
-              <a:rPr lang="en-US" sz="1800" dirty="0" smtClean="0">
+              <a:rPr lang="en-US" sz="2000" dirty="0" smtClean="0">
                 <a:solidFill>
                   <a:schemeClr val="tx1"/>
                 </a:solidFill>
               </a:rPr>
               <a:t> login</a:t>
             </a:r>
-            <a:endParaRPr lang="en" sz="1800" dirty="0">
+            <a:endParaRPr lang="en" sz="2000" dirty="0">
               <a:solidFill>
                 <a:schemeClr val="tx1"/>
               </a:solidFill>
@@ -13344,8 +13346,8 @@
         </p:nvSpPr>
         <p:spPr>
           <a:xfrm>
-            <a:off x="4996275" y="3232463"/>
-            <a:ext cx="1963800" cy="347600"/>
+            <a:off x="4996275" y="3332735"/>
+            <a:ext cx="2468402" cy="347600"/>
           </a:xfrm>
           <a:prstGeom prst="rect">
             <a:avLst/>
@@ -13368,7 +13370,7 @@
               <a:buNone/>
             </a:pPr>
             <a:r>
-              <a:rPr lang="en" sz="1800">
+              <a:rPr lang="en" sz="2000" dirty="0">
                 <a:solidFill>
                   <a:schemeClr val="tx1"/>
                 </a:solidFill>
@@ -13386,7 +13388,7 @@
         </p:nvSpPr>
         <p:spPr>
           <a:xfrm>
-            <a:off x="4644078" y="3913639"/>
+            <a:off x="4644078" y="3880215"/>
             <a:ext cx="2820599" cy="474000"/>
           </a:xfrm>
           <a:prstGeom prst="rect">
@@ -13404,13 +13406,16 @@
           <a:lstStyle/>
           <a:p>
             <a:pPr algn="ctr">
+              <a:lnSpc>
+                <a:spcPct val="120000"/>
+              </a:lnSpc>
               <a:spcBef>
                 <a:spcPts val="0"/>
               </a:spcBef>
               <a:buNone/>
             </a:pPr>
             <a:r>
-              <a:rPr lang="en" sz="1800" dirty="0">
+              <a:rPr lang="en" sz="2000" dirty="0">
                 <a:solidFill>
                   <a:schemeClr val="tx1"/>
                 </a:solidFill>
@@ -13428,7 +13433,7 @@
         </p:nvSpPr>
         <p:spPr>
           <a:xfrm>
-            <a:off x="1332773" y="4595969"/>
+            <a:off x="1249228" y="4763089"/>
             <a:ext cx="2897870" cy="600399"/>
           </a:xfrm>
           <a:prstGeom prst="rect">
@@ -13452,7 +13457,7 @@
               <a:buNone/>
             </a:pPr>
             <a:r>
-              <a:rPr lang="en-US" sz="1800" dirty="0" smtClean="0">
+              <a:rPr lang="en-US" sz="2000" dirty="0" smtClean="0">
                 <a:solidFill>
                   <a:schemeClr val="tx1"/>
                 </a:solidFill>
@@ -13460,7 +13465,7 @@
               <a:t>302 follow </a:t>
             </a:r>
             <a:r>
-              <a:rPr lang="en" sz="1800" dirty="0" smtClean="0">
+              <a:rPr lang="en" sz="2000" dirty="0" smtClean="0">
                 <a:solidFill>
                   <a:schemeClr val="tx1"/>
                 </a:solidFill>
@@ -13468,7 +13473,7 @@
               <a:t>redirect </a:t>
             </a:r>
             <a:r>
-              <a:rPr lang="en" sz="1800" dirty="0">
+              <a:rPr lang="en" sz="2000" dirty="0">
                 <a:solidFill>
                   <a:schemeClr val="tx1"/>
                 </a:solidFill>
@@ -13486,7 +13491,7 @@
         </p:nvSpPr>
         <p:spPr>
           <a:xfrm>
-            <a:off x="4776100" y="4954993"/>
+            <a:off x="4776100" y="4938281"/>
             <a:ext cx="2688600" cy="474000"/>
           </a:xfrm>
           <a:prstGeom prst="rect">
@@ -13504,13 +13509,16 @@
           <a:lstStyle/>
           <a:p>
             <a:pPr>
+              <a:lnSpc>
+                <a:spcPct val="120000"/>
+              </a:lnSpc>
               <a:spcBef>
                 <a:spcPts val="0"/>
               </a:spcBef>
               <a:buNone/>
             </a:pPr>
             <a:r>
-              <a:rPr lang="en" sz="1800" dirty="0">
+              <a:rPr lang="en" sz="2000" dirty="0">
                 <a:solidFill>
                   <a:schemeClr val="tx1"/>
                 </a:solidFill>
@@ -13528,8 +13536,8 @@
         </p:nvSpPr>
         <p:spPr>
           <a:xfrm>
-            <a:off x="4832026" y="5799315"/>
-            <a:ext cx="2316000" cy="347600"/>
+            <a:off x="4832026" y="5866163"/>
+            <a:ext cx="2739398" cy="347600"/>
           </a:xfrm>
           <a:prstGeom prst="rect">
             <a:avLst/>
@@ -13552,7 +13560,7 @@
               <a:buNone/>
             </a:pPr>
             <a:r>
-              <a:rPr lang="en" sz="1800">
+              <a:rPr lang="en" sz="2000" dirty="0">
                 <a:solidFill>
                   <a:schemeClr val="tx1"/>
                 </a:solidFill>
@@ -13570,8 +13578,8 @@
         </p:nvSpPr>
         <p:spPr>
           <a:xfrm>
-            <a:off x="1144502" y="6049839"/>
-            <a:ext cx="3132234" cy="347600"/>
+            <a:off x="1127793" y="6133399"/>
+            <a:ext cx="3631598" cy="347600"/>
           </a:xfrm>
           <a:prstGeom prst="rect">
             <a:avLst/>
@@ -13594,7 +13602,7 @@
               <a:buNone/>
             </a:pPr>
             <a:r>
-              <a:rPr lang="en" sz="1800" dirty="0">
+              <a:rPr lang="en" sz="2000" dirty="0">
                 <a:solidFill>
                   <a:schemeClr val="tx1"/>
                 </a:solidFill>
@@ -13602,7 +13610,7 @@
               <a:t>Logged </a:t>
             </a:r>
             <a:r>
-              <a:rPr lang="en" sz="1800" dirty="0" smtClean="0">
+              <a:rPr lang="en" sz="2000" dirty="0" smtClean="0">
                 <a:solidFill>
                   <a:schemeClr val="tx1"/>
                 </a:solidFill>
@@ -13610,7 +13618,7 @@
               <a:t>In</a:t>
             </a:r>
             <a:r>
-              <a:rPr lang="en-US" sz="1800" dirty="0" smtClean="0">
+              <a:rPr lang="en-US" sz="2000" dirty="0" smtClean="0">
                 <a:solidFill>
                   <a:schemeClr val="tx1"/>
                 </a:solidFill>
@@ -13618,14 +13626,14 @@
               <a:t>, serve </a:t>
             </a:r>
             <a:r>
-              <a:rPr lang="en-US" sz="1800" dirty="0" err="1" smtClean="0">
+              <a:rPr lang="en-US" sz="2000" dirty="0" err="1" smtClean="0">
                 <a:solidFill>
                   <a:schemeClr val="tx1"/>
                 </a:solidFill>
               </a:rPr>
               <a:t>index.html</a:t>
             </a:r>
-            <a:endParaRPr lang="en" sz="1800" dirty="0">
+            <a:endParaRPr lang="en" sz="2000" dirty="0">
               <a:solidFill>
                 <a:schemeClr val="tx1"/>
               </a:solidFill>
@@ -13773,7 +13781,7 @@
         </p:nvCxnSpPr>
         <p:spPr>
           <a:xfrm>
-            <a:off x="1006201" y="5105905"/>
+            <a:off x="1006201" y="5189465"/>
             <a:ext cx="3521649" cy="0"/>
           </a:xfrm>
           <a:prstGeom prst="straightConnector1">
@@ -13897,6 +13905,36 @@
           </a:fontRef>
         </p:style>
       </p:cxnSp>
+      <p:pic>
+        <p:nvPicPr>
+          <p:cNvPr id="25" name="Picture 24" descr="chrome.png"/>
+          <p:cNvPicPr>
+            <a:picLocks noChangeAspect="1"/>
+          </p:cNvPicPr>
+          <p:nvPr/>
+        </p:nvPicPr>
+        <p:blipFill>
+          <a:blip r:embed="rId3">
+            <a:extLst>
+              <a:ext uri="{28A0092B-C50C-407E-A947-70E740481C1C}">
+                <a14:useLocalDpi xmlns:a14="http://schemas.microsoft.com/office/drawing/2010/main" val="0"/>
+              </a:ext>
+            </a:extLst>
+          </a:blip>
+          <a:stretch>
+            <a:fillRect/>
+          </a:stretch>
+        </p:blipFill>
+        <p:spPr>
+          <a:xfrm>
+            <a:off x="475081" y="1379321"/>
+            <a:ext cx="1156405" cy="1156405"/>
+          </a:xfrm>
+          <a:prstGeom prst="rect">
+            <a:avLst/>
+          </a:prstGeom>
+        </p:spPr>
+      </p:pic>
     </p:spTree>
   </p:cSld>
   <p:clrMapOvr>
@@ -13933,8 +13971,8 @@
         </p:nvSpPr>
         <p:spPr>
           <a:xfrm>
-            <a:off x="656784" y="3559186"/>
-            <a:ext cx="4021554" cy="747897"/>
+            <a:off x="573239" y="3626034"/>
+            <a:ext cx="4446449" cy="820738"/>
           </a:xfrm>
           <a:prstGeom prst="rect">
             <a:avLst/>
@@ -13953,10 +13991,10 @@
               </a:lnSpc>
             </a:pPr>
             <a:r>
-              <a:rPr lang="en-US" sz="1800" dirty="0" smtClean="0"/>
+              <a:rPr lang="en-US" sz="2000" dirty="0" smtClean="0"/>
               <a:t>GET /order/1234</a:t>
             </a:r>
-            <a:endParaRPr lang="en-US" sz="1800" dirty="0"/>
+            <a:endParaRPr lang="en-US" sz="2000" dirty="0"/>
           </a:p>
           <a:p>
             <a:pPr>
@@ -13965,18 +14003,18 @@
               </a:lnSpc>
             </a:pPr>
             <a:r>
-              <a:rPr lang="en-US" sz="1800" dirty="0" smtClean="0"/>
+              <a:rPr lang="en-US" sz="2000" dirty="0" smtClean="0"/>
               <a:t>Authorization</a:t>
             </a:r>
             <a:r>
-              <a:rPr lang="en-US" sz="1800" dirty="0"/>
+              <a:rPr lang="en-US" sz="2000" dirty="0"/>
               <a:t>: Bearer </a:t>
             </a:r>
             <a:r>
-              <a:rPr lang="en-US" sz="1800" dirty="0" smtClean="0"/>
+              <a:rPr lang="en-US" sz="2000" dirty="0" smtClean="0"/>
               <a:t>d23a7726-36…</a:t>
             </a:r>
-            <a:endParaRPr lang="en-US" sz="1800" dirty="0"/>
+            <a:endParaRPr lang="en-US" sz="2000" dirty="0"/>
           </a:p>
         </p:txBody>
       </p:sp>
@@ -13988,8 +14026,8 @@
         </p:nvSpPr>
         <p:spPr>
           <a:xfrm>
-            <a:off x="4486921" y="4418418"/>
-            <a:ext cx="3545800" cy="415498"/>
+            <a:off x="4470212" y="4451842"/>
+            <a:ext cx="3917834" cy="451406"/>
           </a:xfrm>
           <a:prstGeom prst="rect">
             <a:avLst/>
@@ -14020,31 +14058,31 @@
           </a:lstStyle>
           <a:p>
             <a:r>
-              <a:rPr lang="en" sz="1800" dirty="0"/>
+              <a:rPr lang="en" sz="2000" dirty="0"/>
               <a:t>Verify </a:t>
             </a:r>
             <a:r>
-              <a:rPr lang="en-US" sz="1800" dirty="0"/>
+              <a:rPr lang="en-US" sz="2000" dirty="0"/>
               <a:t>token</a:t>
             </a:r>
             <a:r>
-              <a:rPr lang="en" sz="1800" dirty="0"/>
+              <a:rPr lang="en" sz="2000" dirty="0"/>
               <a:t> </a:t>
             </a:r>
             <a:r>
-              <a:rPr lang="en-US" sz="1800" dirty="0"/>
+              <a:rPr lang="en-US" sz="2000" dirty="0"/>
               <a:t>w</a:t>
             </a:r>
             <a:r>
-              <a:rPr lang="en-US" sz="1800" dirty="0" smtClean="0"/>
+              <a:rPr lang="en-US" sz="2000" dirty="0" smtClean="0"/>
               <a:t>ith</a:t>
             </a:r>
             <a:r>
-              <a:rPr lang="en" sz="1800" dirty="0" smtClean="0"/>
+              <a:rPr lang="en" sz="2000" dirty="0" smtClean="0"/>
               <a:t> </a:t>
             </a:r>
             <a:r>
-              <a:rPr lang="en" sz="1800" dirty="0"/>
+              <a:rPr lang="en" sz="2000" dirty="0"/>
               <a:t>client ID, secret</a:t>
             </a:r>
           </a:p>
@@ -14146,7 +14184,7 @@
               <a:buNone/>
             </a:pPr>
             <a:r>
-              <a:rPr lang="en" dirty="0">
+              <a:rPr lang="en" sz="1800" dirty="0">
                 <a:solidFill>
                   <a:srgbClr val="FFFFFF"/>
                 </a:solidFill>
@@ -14154,14 +14192,14 @@
               <a:t>Your Web </a:t>
             </a:r>
             <a:r>
-              <a:rPr lang="en-US" dirty="0" smtClean="0">
+              <a:rPr lang="en-US" sz="1800" dirty="0" smtClean="0">
                 <a:solidFill>
                   <a:srgbClr val="FFFFFF"/>
                 </a:solidFill>
               </a:rPr>
               <a:t>Services</a:t>
             </a:r>
-            <a:endParaRPr lang="en" dirty="0">
+            <a:endParaRPr lang="en" sz="1800" dirty="0">
               <a:solidFill>
                 <a:srgbClr val="FFFFFF"/>
               </a:solidFill>
@@ -14211,7 +14249,7 @@
               <a:buNone/>
             </a:pPr>
             <a:r>
-              <a:rPr lang="en-US" dirty="0" err="1" smtClean="0">
+              <a:rPr lang="en-US" sz="1800" dirty="0" err="1" smtClean="0">
                 <a:solidFill>
                   <a:srgbClr val="FFFFFF"/>
                 </a:solidFill>
@@ -14219,14 +14257,14 @@
               <a:t>oAuth</a:t>
             </a:r>
             <a:r>
-              <a:rPr lang="en-US" dirty="0" smtClean="0">
+              <a:rPr lang="en-US" sz="1800" dirty="0" smtClean="0">
                 <a:solidFill>
                   <a:srgbClr val="FFFFFF"/>
                 </a:solidFill>
               </a:rPr>
               <a:t> Provider</a:t>
             </a:r>
-            <a:endParaRPr lang="en" dirty="0">
+            <a:endParaRPr lang="en" sz="1800" dirty="0">
               <a:solidFill>
                 <a:srgbClr val="FFFFFF"/>
               </a:solidFill>
@@ -14349,36 +14387,6 @@
           </a:fontRef>
         </p:style>
       </p:cxnSp>
-      <p:pic>
-        <p:nvPicPr>
-          <p:cNvPr id="6" name="Picture 5" descr="iPhone.png"/>
-          <p:cNvPicPr>
-            <a:picLocks noChangeAspect="1"/>
-          </p:cNvPicPr>
-          <p:nvPr/>
-        </p:nvPicPr>
-        <p:blipFill>
-          <a:blip r:embed="rId3">
-            <a:extLst>
-              <a:ext uri="{28A0092B-C50C-407E-A947-70E740481C1C}">
-                <a14:useLocalDpi xmlns:a14="http://schemas.microsoft.com/office/drawing/2010/main" val="0"/>
-              </a:ext>
-            </a:extLst>
-          </a:blip>
-          <a:stretch>
-            <a:fillRect/>
-          </a:stretch>
-        </p:blipFill>
-        <p:spPr>
-          <a:xfrm>
-            <a:off x="350088" y="1447961"/>
-            <a:ext cx="532694" cy="1334457"/>
-          </a:xfrm>
-          <a:prstGeom prst="rect">
-            <a:avLst/>
-          </a:prstGeom>
-        </p:spPr>
-      </p:pic>
       <p:cxnSp>
         <p:nvCxnSpPr>
           <p:cNvPr id="8" name="Straight Arrow Connector 7"/>
@@ -14420,8 +14428,8 @@
         </p:nvSpPr>
         <p:spPr>
           <a:xfrm>
-            <a:off x="1433370" y="2514128"/>
-            <a:ext cx="1929773" cy="369332"/>
+            <a:off x="1065772" y="2547552"/>
+            <a:ext cx="2133918" cy="400110"/>
           </a:xfrm>
           <a:prstGeom prst="rect">
             <a:avLst/>
@@ -14435,10 +14443,10 @@
           <a:lstStyle/>
           <a:p>
             <a:r>
-              <a:rPr lang="en-US" sz="1800" dirty="0" smtClean="0"/>
+              <a:rPr lang="en-US" sz="2000" dirty="0" smtClean="0"/>
               <a:t>Login to Provider</a:t>
             </a:r>
-            <a:endParaRPr lang="en-US" sz="1800" dirty="0"/>
+            <a:endParaRPr lang="en-US" sz="2000" dirty="0"/>
           </a:p>
         </p:txBody>
       </p:sp>
@@ -14450,8 +14458,8 @@
         </p:nvSpPr>
         <p:spPr>
           <a:xfrm>
-            <a:off x="4639902" y="2956260"/>
-            <a:ext cx="3173878" cy="369332"/>
+            <a:off x="4506230" y="3023108"/>
+            <a:ext cx="3506013" cy="400110"/>
           </a:xfrm>
           <a:prstGeom prst="rect">
             <a:avLst/>
@@ -14465,10 +14473,10 @@
           <a:lstStyle/>
           <a:p>
             <a:r>
-              <a:rPr lang="en-US" sz="1800" dirty="0" smtClean="0"/>
+              <a:rPr lang="en-US" sz="2000" dirty="0" smtClean="0"/>
               <a:t>New access &amp; refresh tokens</a:t>
             </a:r>
-            <a:endParaRPr lang="en-US" sz="1800" dirty="0"/>
+            <a:endParaRPr lang="en-US" sz="2000" dirty="0"/>
           </a:p>
         </p:txBody>
       </p:sp>
@@ -14612,8 +14620,8 @@
         </p:nvSpPr>
         <p:spPr>
           <a:xfrm>
-            <a:off x="729282" y="4644650"/>
-            <a:ext cx="2776909" cy="747897"/>
+            <a:off x="612319" y="4711498"/>
+            <a:ext cx="3070071" cy="820738"/>
           </a:xfrm>
           <a:prstGeom prst="rect">
             <a:avLst/>
@@ -14632,7 +14640,7 @@
               </a:lnSpc>
             </a:pPr>
             <a:r>
-              <a:rPr lang="en-US" sz="1800" dirty="0" smtClean="0"/>
+              <a:rPr lang="en-US" sz="2000" dirty="0" smtClean="0"/>
               <a:t>200 OK</a:t>
             </a:r>
           </a:p>
@@ -14643,10 +14651,10 @@
               </a:lnSpc>
             </a:pPr>
             <a:r>
-              <a:rPr lang="en-US" sz="1800" dirty="0" smtClean="0"/>
+              <a:rPr lang="en-US" sz="2000" dirty="0" smtClean="0"/>
               <a:t>{ id: 1234, quantity: 7, …}</a:t>
             </a:r>
-            <a:endParaRPr lang="en-US" sz="1800" dirty="0"/>
+            <a:endParaRPr lang="en-US" sz="2000" dirty="0"/>
           </a:p>
         </p:txBody>
       </p:sp>
@@ -14725,7 +14733,7 @@
         <p:spPr>
           <a:xfrm>
             <a:off x="619454" y="5678385"/>
-            <a:ext cx="2135132" cy="369332"/>
+            <a:ext cx="2351851" cy="400110"/>
           </a:xfrm>
           <a:prstGeom prst="rect">
             <a:avLst/>
@@ -14739,10 +14747,10 @@
           <a:lstStyle/>
           <a:p>
             <a:r>
-              <a:rPr lang="en-US" sz="1800" dirty="0" smtClean="0"/>
+              <a:rPr lang="en-US" sz="2000" dirty="0" smtClean="0"/>
               <a:t>Send refresh token</a:t>
             </a:r>
-            <a:endParaRPr lang="en-US" sz="1800" dirty="0"/>
+            <a:endParaRPr lang="en-US" sz="2000" dirty="0"/>
           </a:p>
         </p:txBody>
       </p:sp>
@@ -14754,8 +14762,8 @@
         </p:nvSpPr>
         <p:spPr>
           <a:xfrm>
-            <a:off x="4637797" y="6170828"/>
-            <a:ext cx="3173878" cy="369332"/>
+            <a:off x="4520834" y="6204252"/>
+            <a:ext cx="3506013" cy="400110"/>
           </a:xfrm>
           <a:prstGeom prst="rect">
             <a:avLst/>
@@ -14769,13 +14777,43 @@
           <a:lstStyle/>
           <a:p>
             <a:r>
-              <a:rPr lang="en-US" sz="1800" dirty="0" smtClean="0"/>
+              <a:rPr lang="en-US" sz="2000" dirty="0" smtClean="0"/>
               <a:t>New access &amp; refresh tokens</a:t>
             </a:r>
-            <a:endParaRPr lang="en-US" sz="1800" dirty="0"/>
+            <a:endParaRPr lang="en-US" sz="2000" dirty="0"/>
           </a:p>
         </p:txBody>
       </p:sp>
+      <p:pic>
+        <p:nvPicPr>
+          <p:cNvPr id="2" name="Picture 1" descr="iPhone.png"/>
+          <p:cNvPicPr>
+            <a:picLocks noChangeAspect="1"/>
+          </p:cNvPicPr>
+          <p:nvPr/>
+        </p:nvPicPr>
+        <p:blipFill>
+          <a:blip r:embed="rId3">
+            <a:extLst>
+              <a:ext uri="{28A0092B-C50C-407E-A947-70E740481C1C}">
+                <a14:useLocalDpi xmlns:a14="http://schemas.microsoft.com/office/drawing/2010/main" val="0"/>
+              </a:ext>
+            </a:extLst>
+          </a:blip>
+          <a:stretch>
+            <a:fillRect/>
+          </a:stretch>
+        </p:blipFill>
+        <p:spPr>
+          <a:xfrm>
+            <a:off x="322262" y="1417837"/>
+            <a:ext cx="594667" cy="1117282"/>
+          </a:xfrm>
+          <a:prstGeom prst="rect">
+            <a:avLst/>
+          </a:prstGeom>
+        </p:spPr>
+      </p:pic>
     </p:spTree>
     <p:extLst>
       <p:ext uri="{BB962C8B-B14F-4D97-AF65-F5344CB8AC3E}">
@@ -14841,7 +14879,7 @@
               <a:buNone/>
             </a:pPr>
             <a:r>
-              <a:rPr lang="en"/>
+              <a:rPr lang="en" dirty="0"/>
               <a:t>Demo</a:t>
             </a:r>
           </a:p>
@@ -14898,6 +14936,184 @@
   <p:cSld>
     <p:spTree>
       <p:nvGrpSpPr>
+        <p:cNvPr id="1" name=""/>
+        <p:cNvGrpSpPr/>
+        <p:nvPr/>
+      </p:nvGrpSpPr>
+      <p:grpSpPr>
+        <a:xfrm>
+          <a:off x="0" y="0"/>
+          <a:ext cx="0" cy="0"/>
+          <a:chOff x="0" y="0"/>
+          <a:chExt cx="0" cy="0"/>
+        </a:xfrm>
+      </p:grpSpPr>
+      <p:sp>
+        <p:nvSpPr>
+          <p:cNvPr id="2" name="Title 1"/>
+          <p:cNvSpPr>
+            <a:spLocks noGrp="1"/>
+          </p:cNvSpPr>
+          <p:nvPr>
+            <p:ph type="title"/>
+          </p:nvPr>
+        </p:nvSpPr>
+        <p:spPr/>
+        <p:txBody>
+          <a:bodyPr/>
+          <a:lstStyle/>
+          <a:p>
+            <a:r>
+              <a:rPr lang="en-US" dirty="0" smtClean="0"/>
+              <a:t>HMAC</a:t>
+            </a:r>
+            <a:endParaRPr lang="en-US" dirty="0"/>
+          </a:p>
+        </p:txBody>
+      </p:sp>
+      <p:sp>
+        <p:nvSpPr>
+          <p:cNvPr id="3" name="Text Placeholder 2"/>
+          <p:cNvSpPr>
+            <a:spLocks noGrp="1"/>
+          </p:cNvSpPr>
+          <p:nvPr>
+            <p:ph type="body" idx="1"/>
+          </p:nvPr>
+        </p:nvSpPr>
+        <p:spPr/>
+        <p:txBody>
+          <a:bodyPr/>
+          <a:lstStyle/>
+          <a:p>
+            <a:endParaRPr lang="en-US"/>
+          </a:p>
+        </p:txBody>
+      </p:sp>
+    </p:spTree>
+    <p:extLst>
+      <p:ext uri="{BB962C8B-B14F-4D97-AF65-F5344CB8AC3E}">
+        <p14:creationId xmlns:p14="http://schemas.microsoft.com/office/powerpoint/2010/main" val="3776798209"/>
+      </p:ext>
+    </p:extLst>
+  </p:cSld>
+  <p:clrMapOvr>
+    <a:masterClrMapping/>
+  </p:clrMapOvr>
+</p:sld>
+</file>
+
+<file path=ppt/slides/slide34.xml><?xml version="1.0" encoding="utf-8"?>
+<p:sld xmlns:a="http://schemas.openxmlformats.org/drawingml/2006/main" xmlns:r="http://schemas.openxmlformats.org/officeDocument/2006/relationships" xmlns:p="http://schemas.openxmlformats.org/presentationml/2006/main">
+  <p:cSld>
+    <p:spTree>
+      <p:nvGrpSpPr>
+        <p:cNvPr id="1" name="Shape 158"/>
+        <p:cNvGrpSpPr/>
+        <p:nvPr/>
+      </p:nvGrpSpPr>
+      <p:grpSpPr>
+        <a:xfrm>
+          <a:off x="0" y="0"/>
+          <a:ext cx="0" cy="0"/>
+          <a:chOff x="0" y="0"/>
+          <a:chExt cx="0" cy="0"/>
+        </a:xfrm>
+      </p:grpSpPr>
+      <p:sp>
+        <p:nvSpPr>
+          <p:cNvPr id="159" name="Shape 159"/>
+          <p:cNvSpPr txBox="1">
+            <a:spLocks noGrp="1"/>
+          </p:cNvSpPr>
+          <p:nvPr>
+            <p:ph type="title"/>
+          </p:nvPr>
+        </p:nvSpPr>
+        <p:spPr>
+          <a:xfrm>
+            <a:off x="457200" y="274637"/>
+            <a:ext cx="8229600" cy="1143200"/>
+          </a:xfrm>
+          <a:prstGeom prst="rect">
+            <a:avLst/>
+          </a:prstGeom>
+        </p:spPr>
+        <p:txBody>
+          <a:bodyPr lIns="91425" tIns="91425" rIns="91425" bIns="91425" anchor="b" anchorCtr="0">
+            <a:noAutofit/>
+          </a:bodyPr>
+          <a:lstStyle/>
+          <a:p>
+            <a:pPr lvl="0" rtl="0">
+              <a:spcBef>
+                <a:spcPts val="0"/>
+              </a:spcBef>
+              <a:buNone/>
+            </a:pPr>
+            <a:r>
+              <a:rPr lang="en" dirty="0"/>
+              <a:t>Demo</a:t>
+            </a:r>
+          </a:p>
+        </p:txBody>
+      </p:sp>
+      <p:sp>
+        <p:nvSpPr>
+          <p:cNvPr id="160" name="Shape 160"/>
+          <p:cNvSpPr txBox="1">
+            <a:spLocks noGrp="1"/>
+          </p:cNvSpPr>
+          <p:nvPr>
+            <p:ph type="body" idx="1"/>
+          </p:nvPr>
+        </p:nvSpPr>
+        <p:spPr>
+          <a:xfrm>
+            <a:off x="457200" y="1600202"/>
+            <a:ext cx="8229600" cy="4967599"/>
+          </a:xfrm>
+          <a:prstGeom prst="rect">
+            <a:avLst/>
+          </a:prstGeom>
+        </p:spPr>
+        <p:txBody>
+          <a:bodyPr lIns="91425" tIns="91425" rIns="91425" bIns="91425" anchor="t" anchorCtr="0">
+            <a:noAutofit/>
+          </a:bodyPr>
+          <a:lstStyle/>
+          <a:p>
+            <a:pPr lvl="0" rtl="0">
+              <a:spcBef>
+                <a:spcPts val="0"/>
+              </a:spcBef>
+              <a:buNone/>
+            </a:pPr>
+            <a:endParaRPr/>
+          </a:p>
+        </p:txBody>
+      </p:sp>
+    </p:spTree>
+    <p:extLst>
+      <p:ext uri="{BB962C8B-B14F-4D97-AF65-F5344CB8AC3E}">
+        <p14:creationId xmlns:p14="http://schemas.microsoft.com/office/powerpoint/2010/main" val="2665764947"/>
+      </p:ext>
+    </p:extLst>
+  </p:cSld>
+  <p:clrMapOvr>
+    <a:masterClrMapping/>
+  </p:clrMapOvr>
+  <p:transition xmlns:p14="http://schemas.microsoft.com/office/powerpoint/2010/main" spd="slow">
+    <p:cut/>
+  </p:transition>
+</p:sld>
+</file>
+
+<file path=ppt/slides/slide35.xml><?xml version="1.0" encoding="utf-8"?>
+<p:sld xmlns:a="http://schemas.openxmlformats.org/drawingml/2006/main" xmlns:r="http://schemas.openxmlformats.org/officeDocument/2006/relationships" xmlns:p="http://schemas.openxmlformats.org/presentationml/2006/main">
+  <p:cSld>
+    <p:spTree>
+      <p:nvGrpSpPr>
         <p:cNvPr id="1" name="Shape 215"/>
         <p:cNvGrpSpPr/>
         <p:nvPr/>
@@ -15040,7 +15256,7 @@
 </p:sld>
 </file>
 
-<file path=ppt/slides/slide34.xml><?xml version="1.0" encoding="utf-8"?>
+<file path=ppt/slides/slide36.xml><?xml version="1.0" encoding="utf-8"?>
 <p:sld xmlns:a="http://schemas.openxmlformats.org/drawingml/2006/main" xmlns:r="http://schemas.openxmlformats.org/officeDocument/2006/relationships" xmlns:p="http://schemas.openxmlformats.org/presentationml/2006/main">
   <p:cSld>
     <p:spTree>
@@ -15240,7 +15456,7 @@
 </p:sld>
 </file>
 
-<file path=ppt/slides/slide35.xml><?xml version="1.0" encoding="utf-8"?>
+<file path=ppt/slides/slide37.xml><?xml version="1.0" encoding="utf-8"?>
 <p:sld xmlns:a="http://schemas.openxmlformats.org/drawingml/2006/main" xmlns:r="http://schemas.openxmlformats.org/officeDocument/2006/relationships" xmlns:p="http://schemas.openxmlformats.org/presentationml/2006/main">
   <p:cSld>
     <p:bg>
@@ -15321,15 +15537,7 @@
             </a:r>
             <a:r>
               <a:rPr lang="en" sz="2800" dirty="0" smtClean="0"/>
-              <a:t>O</a:t>
-            </a:r>
-            <a:r>
-              <a:rPr lang="en" sz="2800" dirty="0" smtClean="0"/>
-              <a:t>a</a:t>
-            </a:r>
-            <a:r>
-              <a:rPr lang="en" sz="2800" dirty="0" smtClean="0"/>
-              <a:t>uth</a:t>
+              <a:t>Oauth</a:t>
             </a:r>
             <a:r>
               <a:rPr lang="en-US" sz="2800" dirty="0" smtClean="0"/>
@@ -15337,11 +15545,7 @@
             </a:r>
             <a:r>
               <a:rPr lang="en" sz="2800" dirty="0" smtClean="0"/>
-              <a:t> </a:t>
-            </a:r>
-            <a:r>
-              <a:rPr lang="en" sz="2800" dirty="0" smtClean="0"/>
-              <a:t>NTLM &gt; Digest &gt; Basic &gt; Forms</a:t>
+              <a:t> NTLM &gt; Digest &gt; Basic &gt; Forms</a:t>
             </a:r>
           </a:p>
         </p:txBody>
@@ -15357,7 +15561,7 @@
 </p:sld>
 </file>
 
-<file path=ppt/slides/slide36.xml><?xml version="1.0" encoding="utf-8"?>
+<file path=ppt/slides/slide38.xml><?xml version="1.0" encoding="utf-8"?>
 <p:sld xmlns:a="http://schemas.openxmlformats.org/drawingml/2006/main" xmlns:r="http://schemas.openxmlformats.org/officeDocument/2006/relationships" xmlns:p="http://schemas.openxmlformats.org/presentationml/2006/main">
   <p:cSld>
     <p:spTree>
@@ -15412,178 +15616,6 @@
           </a:p>
         </p:txBody>
       </p:sp>
-      <p:grpSp>
-        <p:nvGrpSpPr>
-          <p:cNvPr id="236" name="Shape 236"/>
-          <p:cNvGrpSpPr/>
-          <p:nvPr/>
-        </p:nvGrpSpPr>
-        <p:grpSpPr>
-          <a:xfrm>
-            <a:off x="457203" y="1854733"/>
-            <a:ext cx="2426625" cy="3983667"/>
-            <a:chOff x="1052725" y="1434475"/>
-            <a:chExt cx="2426625" cy="2987750"/>
-          </a:xfrm>
-        </p:grpSpPr>
-        <p:sp>
-          <p:nvSpPr>
-            <p:cNvPr id="237" name="Shape 237"/>
-            <p:cNvSpPr/>
-            <p:nvPr/>
-          </p:nvSpPr>
-          <p:spPr>
-            <a:xfrm>
-              <a:off x="1172950" y="1513725"/>
-              <a:ext cx="2306400" cy="2908500"/>
-            </a:xfrm>
-            <a:prstGeom prst="rect">
-              <a:avLst/>
-            </a:prstGeom>
-            <a:solidFill>
-              <a:srgbClr val="999999"/>
-            </a:solidFill>
-            <a:ln w="19050" cap="flat">
-              <a:solidFill>
-                <a:schemeClr val="dk2"/>
-              </a:solidFill>
-              <a:prstDash val="solid"/>
-              <a:round/>
-              <a:headEnd type="none" w="med" len="med"/>
-              <a:tailEnd type="none" w="med" len="med"/>
-            </a:ln>
-          </p:spPr>
-          <p:txBody>
-            <a:bodyPr lIns="91425" tIns="91425" rIns="91425" bIns="91425" anchor="ctr" anchorCtr="0">
-              <a:noAutofit/>
-            </a:bodyPr>
-            <a:lstStyle/>
-            <a:p>
-              <a:pPr>
-                <a:spcBef>
-                  <a:spcPts val="0"/>
-                </a:spcBef>
-                <a:buNone/>
-              </a:pPr>
-              <a:endParaRPr/>
-            </a:p>
-          </p:txBody>
-        </p:sp>
-        <p:pic>
-          <p:nvPicPr>
-            <p:cNvPr id="238" name="Shape 238"/>
-            <p:cNvPicPr preferRelativeResize="0"/>
-            <p:nvPr/>
-          </p:nvPicPr>
-          <p:blipFill>
-            <a:blip r:embed="rId3">
-              <a:alphaModFix/>
-            </a:blip>
-            <a:stretch>
-              <a:fillRect/>
-            </a:stretch>
-          </p:blipFill>
-          <p:spPr>
-            <a:xfrm>
-              <a:off x="1052725" y="1434475"/>
-              <a:ext cx="2393699" cy="2947900"/>
-            </a:xfrm>
-            <a:prstGeom prst="rect">
-              <a:avLst/>
-            </a:prstGeom>
-            <a:noFill/>
-            <a:ln>
-              <a:noFill/>
-            </a:ln>
-          </p:spPr>
-        </p:pic>
-      </p:grpSp>
-      <p:grpSp>
-        <p:nvGrpSpPr>
-          <p:cNvPr id="239" name="Shape 239"/>
-          <p:cNvGrpSpPr/>
-          <p:nvPr/>
-        </p:nvGrpSpPr>
-        <p:grpSpPr>
-          <a:xfrm>
-            <a:off x="5793803" y="2700735"/>
-            <a:ext cx="1571325" cy="2088465"/>
-            <a:chOff x="6251000" y="1873150"/>
-            <a:chExt cx="1571325" cy="1566349"/>
-          </a:xfrm>
-        </p:grpSpPr>
-        <p:sp>
-          <p:nvSpPr>
-            <p:cNvPr id="240" name="Shape 240"/>
-            <p:cNvSpPr/>
-            <p:nvPr/>
-          </p:nvSpPr>
-          <p:spPr>
-            <a:xfrm>
-              <a:off x="6348125" y="1971000"/>
-              <a:ext cx="1474200" cy="1468499"/>
-            </a:xfrm>
-            <a:prstGeom prst="rect">
-              <a:avLst/>
-            </a:prstGeom>
-            <a:solidFill>
-              <a:srgbClr val="999999"/>
-            </a:solidFill>
-            <a:ln w="19050" cap="flat">
-              <a:solidFill>
-                <a:srgbClr val="000000"/>
-              </a:solidFill>
-              <a:prstDash val="solid"/>
-              <a:round/>
-              <a:headEnd type="none" w="med" len="med"/>
-              <a:tailEnd type="none" w="med" len="med"/>
-            </a:ln>
-          </p:spPr>
-          <p:txBody>
-            <a:bodyPr lIns="91425" tIns="91425" rIns="91425" bIns="91425" anchor="ctr" anchorCtr="0">
-              <a:noAutofit/>
-            </a:bodyPr>
-            <a:lstStyle/>
-            <a:p>
-              <a:pPr>
-                <a:spcBef>
-                  <a:spcPts val="0"/>
-                </a:spcBef>
-                <a:buNone/>
-              </a:pPr>
-              <a:endParaRPr/>
-            </a:p>
-          </p:txBody>
-        </p:sp>
-        <p:pic>
-          <p:nvPicPr>
-            <p:cNvPr id="241" name="Shape 241"/>
-            <p:cNvPicPr preferRelativeResize="0"/>
-            <p:nvPr/>
-          </p:nvPicPr>
-          <p:blipFill>
-            <a:blip r:embed="rId4">
-              <a:alphaModFix/>
-            </a:blip>
-            <a:stretch>
-              <a:fillRect/>
-            </a:stretch>
-          </p:blipFill>
-          <p:spPr>
-            <a:xfrm>
-              <a:off x="6251000" y="1873150"/>
-              <a:ext cx="1524000" cy="1524000"/>
-            </a:xfrm>
-            <a:prstGeom prst="rect">
-              <a:avLst/>
-            </a:prstGeom>
-            <a:noFill/>
-            <a:ln>
-              <a:noFill/>
-            </a:ln>
-          </p:spPr>
-        </p:pic>
-      </p:grpSp>
       <p:sp>
         <p:nvSpPr>
           <p:cNvPr id="242" name="Shape 242"/>
@@ -15670,6 +15702,80 @@
           </a:p>
         </p:txBody>
       </p:sp>
+      <p:pic>
+        <p:nvPicPr>
+          <p:cNvPr id="11" name="Picture 10" descr="abpsmall.jpg"/>
+          <p:cNvPicPr>
+            <a:picLocks noChangeAspect="1"/>
+          </p:cNvPicPr>
+          <p:nvPr/>
+        </p:nvPicPr>
+        <p:blipFill>
+          <a:blip r:embed="rId3">
+            <a:extLst>
+              <a:ext uri="{28A0092B-C50C-407E-A947-70E740481C1C}">
+                <a14:useLocalDpi xmlns:a14="http://schemas.microsoft.com/office/drawing/2010/main" val="0"/>
+              </a:ext>
+            </a:extLst>
+          </a:blip>
+          <a:stretch>
+            <a:fillRect/>
+          </a:stretch>
+        </p:blipFill>
+        <p:spPr>
+          <a:xfrm>
+            <a:off x="667379" y="1671153"/>
+            <a:ext cx="3299842" cy="4063845"/>
+          </a:xfrm>
+          <a:prstGeom prst="rect">
+            <a:avLst/>
+          </a:prstGeom>
+          <a:effectLst>
+            <a:outerShdw blurRad="50800" dist="38100" dir="2700000" algn="tl" rotWithShape="0">
+              <a:prstClr val="black">
+                <a:alpha val="40000"/>
+              </a:prstClr>
+            </a:outerShdw>
+          </a:effectLst>
+        </p:spPr>
+      </p:pic>
+      <p:pic>
+        <p:nvPicPr>
+          <p:cNvPr id="12" name="Picture 11" descr="hp.jpeg"/>
+          <p:cNvPicPr>
+            <a:picLocks noChangeAspect="1"/>
+          </p:cNvPicPr>
+          <p:nvPr/>
+        </p:nvPicPr>
+        <p:blipFill>
+          <a:blip r:embed="rId4">
+            <a:extLst>
+              <a:ext uri="{28A0092B-C50C-407E-A947-70E740481C1C}">
+                <a14:useLocalDpi xmlns:a14="http://schemas.microsoft.com/office/drawing/2010/main" val="0"/>
+              </a:ext>
+            </a:extLst>
+          </a:blip>
+          <a:stretch>
+            <a:fillRect/>
+          </a:stretch>
+        </p:blipFill>
+        <p:spPr>
+          <a:xfrm>
+            <a:off x="5588000" y="2413000"/>
+            <a:ext cx="2032000" cy="2032000"/>
+          </a:xfrm>
+          <a:prstGeom prst="rect">
+            <a:avLst/>
+          </a:prstGeom>
+          <a:effectLst>
+            <a:outerShdw blurRad="50800" dist="38100" dir="2700000" algn="tl" rotWithShape="0">
+              <a:prstClr val="black">
+                <a:alpha val="40000"/>
+              </a:prstClr>
+            </a:outerShdw>
+          </a:effectLst>
+        </p:spPr>
+      </p:pic>
     </p:spTree>
   </p:cSld>
   <p:clrMapOvr>
@@ -15681,7 +15787,7 @@
 </p:sld>
 </file>
 
-<file path=ppt/slides/slide37.xml><?xml version="1.0" encoding="utf-8"?>
+<file path=ppt/slides/slide39.xml><?xml version="1.0" encoding="utf-8"?>
 <p:sld xmlns:a="http://schemas.openxmlformats.org/drawingml/2006/main" xmlns:r="http://schemas.openxmlformats.org/officeDocument/2006/relationships" xmlns:p="http://schemas.openxmlformats.org/presentationml/2006/main">
   <p:cSld>
     <p:spTree>
@@ -15963,11 +16069,7 @@
             </a:pPr>
             <a:r>
               <a:rPr lang="en-US" sz="3200" dirty="0" smtClean="0"/>
-              <a:t>Not </a:t>
-            </a:r>
-            <a:r>
-              <a:rPr lang="en-US" sz="3200" dirty="0" smtClean="0"/>
-              <a:t>re-inventing the wheel</a:t>
+              <a:t>Not re-inventing the wheel</a:t>
             </a:r>
           </a:p>
           <a:p>
@@ -15984,11 +16086,7 @@
             </a:pPr>
             <a:r>
               <a:rPr lang="en-US" sz="3200" dirty="0" smtClean="0"/>
-              <a:t>Existing technologies </a:t>
-            </a:r>
-            <a:r>
-              <a:rPr lang="en-US" sz="3200" dirty="0" smtClean="0"/>
-              <a:t>make this easy</a:t>
+              <a:t>Existing technologies make this easy</a:t>
             </a:r>
             <a:endParaRPr lang="en-US" sz="3200" dirty="0"/>
           </a:p>

</xml_diff>

<commit_message>
Small changes and adding PDF
</commit_message>
<xml_diff>
--- a/MobileAuthWebWorld.pptx
+++ b/MobileAuthWebWorld.pptx
@@ -268,7 +268,7 @@
   </p:defaultTextStyle>
   <p:extLst>
     <p:ext uri="{EFAFB233-063F-42B5-8137-9DF3F51BA10A}">
-      <p15:sldGuideLst xmlns:p15="http://schemas.microsoft.com/office/powerpoint/2012/main" xmlns="">
+      <p15:sldGuideLst xmlns="" xmlns:p15="http://schemas.microsoft.com/office/powerpoint/2012/main">
         <p15:guide id="1" orient="horz" pos="1620">
           <p15:clr>
             <a:srgbClr val="A4A3A4"/>
@@ -8021,12 +8021,94 @@
               <a:buNone/>
             </a:pPr>
             <a:r>
-              <a:rPr lang="en"/>
+              <a:rPr lang="en" dirty="0"/>
               <a:t>David Truxall, Ph.D.</a:t>
             </a:r>
           </a:p>
         </p:txBody>
       </p:sp>
+      <p:sp>
+        <p:nvSpPr>
+          <p:cNvPr id="2" name="TextBox 1">
+            <a:hlinkClick r:id="" action="ppaction://noaction"/>
+          </p:cNvPr>
+          <p:cNvSpPr txBox="1"/>
+          <p:nvPr/>
+        </p:nvSpPr>
+        <p:spPr>
+          <a:xfrm>
+            <a:off x="552128" y="5620496"/>
+            <a:ext cx="3925884" cy="646331"/>
+          </a:xfrm>
+          <a:prstGeom prst="rect">
+            <a:avLst/>
+          </a:prstGeom>
+          <a:noFill/>
+        </p:spPr>
+        <p:txBody>
+          <a:bodyPr wrap="square" rtlCol="0">
+            <a:spAutoFit/>
+          </a:bodyPr>
+          <a:lstStyle/>
+          <a:p>
+            <a:r>
+              <a:rPr lang="en-US" sz="3600" dirty="0" err="1" smtClean="0">
+                <a:hlinkClick r:id="" action="ppaction://noaction"/>
+              </a:rPr>
+              <a:t>bit.ly</a:t>
+            </a:r>
+            <a:r>
+              <a:rPr lang="en-US" sz="3600" dirty="0" smtClean="0">
+                <a:hlinkClick r:id="" action="ppaction://noaction"/>
+              </a:rPr>
+              <a:t>/</a:t>
+            </a:r>
+            <a:r>
+              <a:rPr lang="en-US" sz="3600" dirty="0" err="1" smtClean="0">
+                <a:hlinkClick r:id="" action="ppaction://noaction"/>
+              </a:rPr>
+              <a:t>mobileauth</a:t>
+            </a:r>
+            <a:endParaRPr lang="en-US" sz="3600" dirty="0"/>
+          </a:p>
+        </p:txBody>
+      </p:sp>
+      <p:pic>
+        <p:nvPicPr>
+          <p:cNvPr id="3" name="Picture 2" descr="qr_code_without_logo.jpg"/>
+          <p:cNvPicPr>
+            <a:picLocks noChangeAspect="1"/>
+          </p:cNvPicPr>
+          <p:nvPr/>
+        </p:nvPicPr>
+        <p:blipFill>
+          <a:blip r:embed="rId3">
+            <a:extLst>
+              <a:ext uri="{28A0092B-C50C-407E-A947-70E740481C1C}">
+                <a14:useLocalDpi xmlns:a14="http://schemas.microsoft.com/office/drawing/2010/main" val="0"/>
+              </a:ext>
+            </a:extLst>
+          </a:blip>
+          <a:stretch>
+            <a:fillRect/>
+          </a:stretch>
+        </p:blipFill>
+        <p:spPr>
+          <a:xfrm>
+            <a:off x="6600055" y="4352604"/>
+            <a:ext cx="2222905" cy="2222905"/>
+          </a:xfrm>
+          <a:prstGeom prst="rect">
+            <a:avLst/>
+          </a:prstGeom>
+          <a:ln>
+            <a:noFill/>
+          </a:ln>
+          <a:effectLst>
+            <a:softEdge rad="112500"/>
+          </a:effectLst>
+        </p:spPr>
+      </p:pic>
     </p:spTree>
   </p:cSld>
   <p:clrMapOvr>
@@ -8421,15 +8503,7 @@
                   <a:srgbClr val="3A81BA"/>
                 </a:solidFill>
               </a:rPr>
-              <a:t>, </a:t>
-            </a:r>
-            <a:r>
-              <a:rPr lang="en-US" sz="2800" dirty="0" smtClean="0">
-                <a:solidFill>
-                  <a:srgbClr val="3A81BA"/>
-                </a:solidFill>
-              </a:rPr>
-              <a:t>Authorization</a:t>
+              <a:t>, Authorization</a:t>
             </a:r>
             <a:endParaRPr lang="en" sz="2800" dirty="0" smtClean="0">
               <a:solidFill>
@@ -9679,6 +9753,42 @@
           </a:p>
         </p:txBody>
       </p:sp>
+      <p:pic>
+        <p:nvPicPr>
+          <p:cNvPr id="3" name="Picture 2" descr="Screen Shot 2015-01-09 at 10.53.52 AM.png"/>
+          <p:cNvPicPr>
+            <a:picLocks noChangeAspect="1"/>
+          </p:cNvPicPr>
+          <p:nvPr/>
+        </p:nvPicPr>
+        <p:blipFill rotWithShape="1">
+          <a:blip r:embed="rId2">
+            <a:extLst>
+              <a:ext uri="{28A0092B-C50C-407E-A947-70E740481C1C}">
+                <a14:useLocalDpi xmlns:a14="http://schemas.microsoft.com/office/drawing/2010/main" val="0"/>
+              </a:ext>
+            </a:extLst>
+          </a:blip>
+          <a:srcRect l="21014" t="21636" r="39881" b="33332"/>
+          <a:stretch/>
+        </p:blipFill>
+        <p:spPr>
+          <a:xfrm>
+            <a:off x="1921535" y="1871692"/>
+            <a:ext cx="4745356" cy="3415404"/>
+          </a:xfrm>
+          <a:prstGeom prst="rect">
+            <a:avLst/>
+          </a:prstGeom>
+          <a:effectLst>
+            <a:outerShdw blurRad="50800" dist="38100" dir="2700000" algn="tl" rotWithShape="0">
+              <a:prstClr val="black">
+                <a:alpha val="40000"/>
+              </a:prstClr>
+            </a:outerShdw>
+          </a:effectLst>
+        </p:spPr>
+      </p:pic>
     </p:spTree>
     <p:extLst>
       <p:ext uri="{BB962C8B-B14F-4D97-AF65-F5344CB8AC3E}">
@@ -10557,7 +10667,7 @@
       </p:pic>
       <p:pic>
         <p:nvPicPr>
-          <p:cNvPr id="3" name="Picture 2" descr="hp.jpeg"/>
+          <p:cNvPr id="7" name="Picture 6" descr="hp.png"/>
           <p:cNvPicPr>
             <a:picLocks noChangeAspect="1"/>
           </p:cNvPicPr>
@@ -10577,19 +10687,12 @@
         </p:blipFill>
         <p:spPr>
           <a:xfrm>
-            <a:off x="5588000" y="2413000"/>
-            <a:ext cx="2032000" cy="2032000"/>
+            <a:off x="5595208" y="2700100"/>
+            <a:ext cx="1862152" cy="1862152"/>
           </a:xfrm>
           <a:prstGeom prst="rect">
             <a:avLst/>
           </a:prstGeom>
-          <a:effectLst>
-            <a:outerShdw blurRad="50800" dist="38100" dir="2700000" algn="tl" rotWithShape="0">
-              <a:prstClr val="black">
-                <a:alpha val="40000"/>
-              </a:prstClr>
-            </a:outerShdw>
-          </a:effectLst>
         </p:spPr>
       </p:pic>
     </p:spTree>
@@ -13073,7 +13176,6 @@
               <a:rPr lang="en-US" sz="3200" dirty="0" smtClean="0"/>
               <a:t>Delegation of authorization</a:t>
             </a:r>
-            <a:endParaRPr lang="en-US" sz="3200" dirty="0" smtClean="0"/>
           </a:p>
           <a:p>
             <a:pPr>
@@ -14594,15 +14696,7 @@
                   <a:srgbClr val="FFFFFF"/>
                 </a:solidFill>
               </a:rPr>
-              <a:t>OA</a:t>
-            </a:r>
-            <a:r>
-              <a:rPr lang="en-US" sz="1800" dirty="0" err="1" smtClean="0">
-                <a:solidFill>
-                  <a:srgbClr val="FFFFFF"/>
-                </a:solidFill>
-              </a:rPr>
-              <a:t>uth</a:t>
+              <a:t>OAuth</a:t>
             </a:r>
             <a:r>
               <a:rPr lang="en-US" sz="1800" dirty="0" smtClean="0">
@@ -14610,15 +14704,7 @@
                   <a:srgbClr val="FFFFFF"/>
                 </a:solidFill>
               </a:rPr>
-              <a:t> </a:t>
-            </a:r>
-            <a:r>
-              <a:rPr lang="en-US" sz="1800" dirty="0" smtClean="0">
-                <a:solidFill>
-                  <a:srgbClr val="FFFFFF"/>
-                </a:solidFill>
-              </a:rPr>
-              <a:t>Provider</a:t>
+              <a:t> Provider</a:t>
             </a:r>
             <a:endParaRPr lang="en" sz="1800" dirty="0">
               <a:solidFill>
@@ -15350,11 +15436,7 @@
             </a:pPr>
             <a:r>
               <a:rPr lang="en-US" dirty="0" smtClean="0"/>
-              <a:t>Guarantee </a:t>
-            </a:r>
-            <a:r>
-              <a:rPr lang="en-US" dirty="0" smtClean="0"/>
-              <a:t>authenticity of message</a:t>
+              <a:t>Guarantee authenticity of message</a:t>
             </a:r>
           </a:p>
           <a:p>
@@ -15925,15 +16007,7 @@
             </a:pPr>
             <a:r>
               <a:rPr lang="en-US" sz="3200" dirty="0" smtClean="0"/>
-              <a:t>Replacement for </a:t>
-            </a:r>
-            <a:r>
-              <a:rPr lang="en-US" sz="3200" dirty="0" smtClean="0"/>
-              <a:t>actual devices/</a:t>
-            </a:r>
-            <a:r>
-              <a:rPr lang="en-US" sz="3200" dirty="0" smtClean="0"/>
-              <a:t>badges</a:t>
+              <a:t>Replacement for actual devices/badges</a:t>
             </a:r>
           </a:p>
           <a:p>
@@ -16452,7 +16526,7 @@
         <p:spPr>
           <a:xfrm>
             <a:off x="457200" y="274637"/>
-            <a:ext cx="8229600" cy="1143200"/>
+            <a:ext cx="8229600" cy="627786"/>
           </a:xfrm>
           <a:prstGeom prst="rect">
             <a:avLst/>
@@ -16471,7 +16545,7 @@
               <a:buNone/>
             </a:pPr>
             <a:r>
-              <a:rPr lang="en"/>
+              <a:rPr lang="en" dirty="0"/>
               <a:t>Yet Another Shameless Plug</a:t>
             </a:r>
           </a:p>
@@ -16485,8 +16559,8 @@
         </p:nvSpPr>
         <p:spPr>
           <a:xfrm>
-            <a:off x="5405375" y="1405700"/>
-            <a:ext cx="2224500" cy="856000"/>
+            <a:off x="5405375" y="1054748"/>
+            <a:ext cx="2224500" cy="666531"/>
           </a:xfrm>
           <a:prstGeom prst="rect">
             <a:avLst/>
@@ -16509,7 +16583,7 @@
               <a:buNone/>
             </a:pPr>
             <a:r>
-              <a:rPr lang="en" sz="3000">
+              <a:rPr lang="en" sz="3000" dirty="0">
                 <a:latin typeface="Varela Round"/>
                 <a:ea typeface="Varela Round"/>
                 <a:cs typeface="Varela Round"/>
@@ -16528,8 +16602,8 @@
         </p:nvSpPr>
         <p:spPr>
           <a:xfrm>
-            <a:off x="4540703" y="5333567"/>
-            <a:ext cx="4130999" cy="792400"/>
+            <a:off x="4555801" y="1725764"/>
+            <a:ext cx="4130999" cy="654876"/>
           </a:xfrm>
           <a:prstGeom prst="rect">
             <a:avLst/>
@@ -16552,7 +16626,7 @@
               <a:buNone/>
             </a:pPr>
             <a:r>
-              <a:rPr lang="en" sz="3000">
+              <a:rPr lang="en" sz="3000" dirty="0">
                 <a:latin typeface="Varela Round"/>
                 <a:ea typeface="Varela Round"/>
                 <a:cs typeface="Varela Round"/>
@@ -16585,7 +16659,7 @@
         </p:blipFill>
         <p:spPr>
           <a:xfrm>
-            <a:off x="667379" y="1671153"/>
+            <a:off x="552128" y="1102961"/>
             <a:ext cx="3299842" cy="4063845"/>
           </a:xfrm>
           <a:prstGeom prst="rect">
@@ -16600,9 +16674,55 @@
           </a:effectLst>
         </p:spPr>
       </p:pic>
+      <p:sp>
+        <p:nvSpPr>
+          <p:cNvPr id="7" name="TextBox 6">
+            <a:hlinkClick r:id="" action="ppaction://noaction"/>
+          </p:cNvPr>
+          <p:cNvSpPr txBox="1"/>
+          <p:nvPr/>
+        </p:nvSpPr>
+        <p:spPr>
+          <a:xfrm>
+            <a:off x="552128" y="5620496"/>
+            <a:ext cx="3925884" cy="646331"/>
+          </a:xfrm>
+          <a:prstGeom prst="rect">
+            <a:avLst/>
+          </a:prstGeom>
+          <a:noFill/>
+        </p:spPr>
+        <p:txBody>
+          <a:bodyPr wrap="square" rtlCol="0">
+            <a:spAutoFit/>
+          </a:bodyPr>
+          <a:lstStyle/>
+          <a:p>
+            <a:r>
+              <a:rPr lang="en-US" sz="3600" dirty="0" err="1" smtClean="0">
+                <a:hlinkClick r:id="" action="ppaction://noaction"/>
+              </a:rPr>
+              <a:t>bit.ly</a:t>
+            </a:r>
+            <a:r>
+              <a:rPr lang="en-US" sz="3600" dirty="0" smtClean="0">
+                <a:hlinkClick r:id="" action="ppaction://noaction"/>
+              </a:rPr>
+              <a:t>/</a:t>
+            </a:r>
+            <a:r>
+              <a:rPr lang="en-US" sz="3600" dirty="0" err="1" smtClean="0">
+                <a:hlinkClick r:id="" action="ppaction://noaction"/>
+              </a:rPr>
+              <a:t>mobileauth</a:t>
+            </a:r>
+            <a:endParaRPr lang="en-US" sz="3600" dirty="0"/>
+          </a:p>
+        </p:txBody>
+      </p:sp>
       <p:pic>
         <p:nvPicPr>
-          <p:cNvPr id="12" name="Picture 11" descr="hp.jpeg"/>
+          <p:cNvPr id="8" name="Picture 7" descr="qr_code_without_logo.jpg"/>
           <p:cNvPicPr>
             <a:picLocks noChangeAspect="1"/>
           </p:cNvPicPr>
@@ -16622,19 +16742,48 @@
         </p:blipFill>
         <p:spPr>
           <a:xfrm>
-            <a:off x="5588000" y="2413000"/>
-            <a:ext cx="2032000" cy="2032000"/>
+            <a:off x="5588000" y="4509043"/>
+            <a:ext cx="2222905" cy="2222905"/>
           </a:xfrm>
           <a:prstGeom prst="rect">
             <a:avLst/>
           </a:prstGeom>
+          <a:ln>
+            <a:noFill/>
+          </a:ln>
           <a:effectLst>
-            <a:outerShdw blurRad="50800" dist="38100" dir="2700000" algn="tl" rotWithShape="0">
-              <a:prstClr val="black">
-                <a:alpha val="40000"/>
-              </a:prstClr>
-            </a:outerShdw>
+            <a:softEdge rad="112500"/>
           </a:effectLst>
+        </p:spPr>
+      </p:pic>
+      <p:pic>
+        <p:nvPicPr>
+          <p:cNvPr id="2" name="Picture 1" descr="hp.png"/>
+          <p:cNvPicPr>
+            <a:picLocks noChangeAspect="1"/>
+          </p:cNvPicPr>
+          <p:nvPr/>
+        </p:nvPicPr>
+        <p:blipFill>
+          <a:blip r:embed="rId5">
+            <a:extLst>
+              <a:ext uri="{28A0092B-C50C-407E-A947-70E740481C1C}">
+                <a14:useLocalDpi xmlns:a14="http://schemas.microsoft.com/office/drawing/2010/main" val="0"/>
+              </a:ext>
+            </a:extLst>
+          </a:blip>
+          <a:stretch>
+            <a:fillRect/>
+          </a:stretch>
+        </p:blipFill>
+        <p:spPr>
+          <a:xfrm>
+            <a:off x="5948404" y="2700100"/>
+            <a:ext cx="1442120" cy="1442120"/>
+          </a:xfrm>
+          <a:prstGeom prst="rect">
+            <a:avLst/>
+          </a:prstGeom>
         </p:spPr>
       </p:pic>
     </p:spTree>
@@ -16823,13 +16972,7 @@
               <a:rPr lang="en-US" dirty="0" smtClean="0">
                 <a:hlinkClick r:id="" action="ppaction://noaction"/>
               </a:rPr>
-              <a:t>RESTful </a:t>
-            </a:r>
-            <a:r>
-              <a:rPr lang="en-US" dirty="0" smtClean="0">
-                <a:hlinkClick r:id="" action="ppaction://noaction"/>
-              </a:rPr>
-              <a:t>Cookbook</a:t>
+              <a:t>RESTful Cookbook</a:t>
             </a:r>
             <a:endParaRPr lang="en-US" dirty="0" smtClean="0"/>
           </a:p>

</xml_diff>